<commit_message>
Agenda Änderung und Bilder hinzugefügt
</commit_message>
<xml_diff>
--- a/Fullstack Development/Backend/Backend.pptx
+++ b/Fullstack Development/Backend/Backend.pptx
@@ -5,7 +5,7 @@
     <p:sldMasterId id="2147483672" r:id="rId1"/>
   </p:sldMasterIdLst>
   <p:notesMasterIdLst>
-    <p:notesMasterId r:id="rId27"/>
+    <p:notesMasterId r:id="rId33"/>
   </p:notesMasterIdLst>
   <p:sldIdLst>
     <p:sldId id="256" r:id="rId2"/>
@@ -18,21 +18,27 @@
     <p:sldId id="263" r:id="rId9"/>
     <p:sldId id="264" r:id="rId10"/>
     <p:sldId id="265" r:id="rId11"/>
-    <p:sldId id="266" r:id="rId12"/>
-    <p:sldId id="280" r:id="rId13"/>
-    <p:sldId id="279" r:id="rId14"/>
-    <p:sldId id="267" r:id="rId15"/>
-    <p:sldId id="268" r:id="rId16"/>
-    <p:sldId id="269" r:id="rId17"/>
-    <p:sldId id="270" r:id="rId18"/>
-    <p:sldId id="271" r:id="rId19"/>
-    <p:sldId id="272" r:id="rId20"/>
-    <p:sldId id="273" r:id="rId21"/>
-    <p:sldId id="274" r:id="rId22"/>
-    <p:sldId id="275" r:id="rId23"/>
-    <p:sldId id="276" r:id="rId24"/>
-    <p:sldId id="277" r:id="rId25"/>
-    <p:sldId id="278" r:id="rId26"/>
+    <p:sldId id="287" r:id="rId12"/>
+    <p:sldId id="266" r:id="rId13"/>
+    <p:sldId id="280" r:id="rId14"/>
+    <p:sldId id="279" r:id="rId15"/>
+    <p:sldId id="267" r:id="rId16"/>
+    <p:sldId id="268" r:id="rId17"/>
+    <p:sldId id="269" r:id="rId18"/>
+    <p:sldId id="270" r:id="rId19"/>
+    <p:sldId id="281" r:id="rId20"/>
+    <p:sldId id="282" r:id="rId21"/>
+    <p:sldId id="283" r:id="rId22"/>
+    <p:sldId id="284" r:id="rId23"/>
+    <p:sldId id="285" r:id="rId24"/>
+    <p:sldId id="286" r:id="rId25"/>
+    <p:sldId id="272" r:id="rId26"/>
+    <p:sldId id="273" r:id="rId27"/>
+    <p:sldId id="274" r:id="rId28"/>
+    <p:sldId id="275" r:id="rId29"/>
+    <p:sldId id="276" r:id="rId30"/>
+    <p:sldId id="277" r:id="rId31"/>
+    <p:sldId id="278" r:id="rId32"/>
   </p:sldIdLst>
   <p:sldSz cx="12192000" cy="6858000"/>
   <p:notesSz cx="6858000" cy="9144000"/>
@@ -131,6 +137,11 @@
       </a:defRPr>
     </a:lvl9pPr>
   </p:defaultTextStyle>
+  <p:extLst>
+    <p:ext uri="{EFAFB233-063F-42B5-8137-9DF3F51BA10A}">
+      <p15:sldGuideLst xmlns:p15="http://schemas.microsoft.com/office/powerpoint/2012/main"/>
+    </p:ext>
+  </p:extLst>
 </p:presentation>
 </file>
 
@@ -216,7 +227,7 @@
           <a:p>
             <a:fld id="{D0E886A7-93D2-4901-9D29-3DFD8E951630}" type="datetimeFigureOut">
               <a:rPr lang="de-DE" smtClean="0"/>
-              <a:t>01.07.2018</a:t>
+              <a:t>08.07.2018</a:t>
             </a:fld>
             <a:endParaRPr lang="de-DE"/>
           </a:p>
@@ -673,7 +684,7 @@
           <a:p>
             <a:fld id="{67D3EF25-16CA-4850-B7D5-931E50A29AF5}" type="datetime1">
               <a:rPr lang="de-DE" smtClean="0"/>
-              <a:t>01.07.2018</a:t>
+              <a:t>08.07.2018</a:t>
             </a:fld>
             <a:endParaRPr lang="de-DE"/>
           </a:p>
@@ -881,7 +892,7 @@
           <a:p>
             <a:fld id="{12FC609E-8343-4D7B-A950-C2A803A7D1DA}" type="datetime1">
               <a:rPr lang="de-DE" smtClean="0"/>
-              <a:t>01.07.2018</a:t>
+              <a:t>08.07.2018</a:t>
             </a:fld>
             <a:endParaRPr lang="de-DE"/>
           </a:p>
@@ -1064,7 +1075,7 @@
           <a:p>
             <a:fld id="{5A339F3F-2B1B-4606-A568-E70F359E3B91}" type="datetime1">
               <a:rPr lang="de-DE" smtClean="0"/>
-              <a:t>01.07.2018</a:t>
+              <a:t>08.07.2018</a:t>
             </a:fld>
             <a:endParaRPr lang="de-DE"/>
           </a:p>
@@ -1272,7 +1283,7 @@
           <a:p>
             <a:fld id="{59587CBD-263B-44E1-97CC-72A99C754E3D}" type="datetime1">
               <a:rPr lang="de-DE" smtClean="0"/>
-              <a:t>01.07.2018</a:t>
+              <a:t>08.07.2018</a:t>
             </a:fld>
             <a:endParaRPr lang="de-DE"/>
           </a:p>
@@ -1570,7 +1581,7 @@
           <a:p>
             <a:fld id="{F27193F0-2F36-4C63-A83F-4A12ACECD067}" type="datetime1">
               <a:rPr lang="de-DE" smtClean="0"/>
-              <a:t>01.07.2018</a:t>
+              <a:t>08.07.2018</a:t>
             </a:fld>
             <a:endParaRPr lang="de-DE"/>
           </a:p>
@@ -1845,7 +1856,7 @@
           <a:p>
             <a:fld id="{AF268981-57FA-4486-BA19-07384DC8427A}" type="datetime1">
               <a:rPr lang="de-DE" smtClean="0"/>
-              <a:t>01.07.2018</a:t>
+              <a:t>08.07.2018</a:t>
             </a:fld>
             <a:endParaRPr lang="de-DE"/>
           </a:p>
@@ -2255,7 +2266,7 @@
           <a:p>
             <a:fld id="{2F91000B-FC35-4526-BA33-C291C7D06ED2}" type="datetime1">
               <a:rPr lang="de-DE" smtClean="0"/>
-              <a:t>01.07.2018</a:t>
+              <a:t>08.07.2018</a:t>
             </a:fld>
             <a:endParaRPr lang="de-DE"/>
           </a:p>
@@ -2376,7 +2387,7 @@
           <a:p>
             <a:fld id="{C010F6C7-151E-4C03-BEED-F131600785CF}" type="datetime1">
               <a:rPr lang="de-DE" smtClean="0"/>
-              <a:t>01.07.2018</a:t>
+              <a:t>08.07.2018</a:t>
             </a:fld>
             <a:endParaRPr lang="de-DE"/>
           </a:p>
@@ -2474,7 +2485,7 @@
           <a:p>
             <a:fld id="{1EA3D463-F3AB-4A23-9108-37AE411A2E62}" type="datetime1">
               <a:rPr lang="de-DE" smtClean="0"/>
-              <a:t>01.07.2018</a:t>
+              <a:t>08.07.2018</a:t>
             </a:fld>
             <a:endParaRPr lang="de-DE"/>
           </a:p>
@@ -2767,7 +2778,7 @@
           <a:p>
             <a:fld id="{A59C6A3C-771F-4015-BBF4-1857B8878423}" type="datetime1">
               <a:rPr lang="de-DE" smtClean="0"/>
-              <a:t>01.07.2018</a:t>
+              <a:t>08.07.2018</a:t>
             </a:fld>
             <a:endParaRPr lang="de-DE"/>
           </a:p>
@@ -3050,7 +3061,7 @@
           <a:p>
             <a:fld id="{92DA9242-9C4E-4816-964F-CB5F09DA4644}" type="datetime1">
               <a:rPr lang="de-DE" smtClean="0"/>
-              <a:t>01.07.2018</a:t>
+              <a:t>08.07.2018</a:t>
             </a:fld>
             <a:endParaRPr lang="de-DE"/>
           </a:p>
@@ -3303,7 +3314,7 @@
           <a:p>
             <a:fld id="{F1AA6D40-1CAD-4DA0-82A7-B0046B88F926}" type="datetime1">
               <a:rPr lang="de-DE" smtClean="0"/>
-              <a:t>01.07.2018</a:t>
+              <a:t>08.07.2018</a:t>
             </a:fld>
             <a:endParaRPr lang="de-DE"/>
           </a:p>
@@ -4020,6 +4031,47 @@
           </a:p>
         </p:txBody>
       </p:sp>
+      <p:sp>
+        <p:nvSpPr>
+          <p:cNvPr id="8" name="Textfeld 7">
+            <a:extLst>
+              <a:ext uri="{FF2B5EF4-FFF2-40B4-BE49-F238E27FC236}">
+                <a16:creationId xmlns:a16="http://schemas.microsoft.com/office/drawing/2014/main" id="{A8C28E9A-01B9-4720-8E9F-3A833E0E629A}"/>
+              </a:ext>
+            </a:extLst>
+          </p:cNvPr>
+          <p:cNvSpPr txBox="1"/>
+          <p:nvPr/>
+        </p:nvSpPr>
+        <p:spPr>
+          <a:xfrm>
+            <a:off x="4842932" y="5993425"/>
+            <a:ext cx="1380506" cy="215444"/>
+          </a:xfrm>
+          <a:prstGeom prst="rect">
+            <a:avLst/>
+          </a:prstGeom>
+          <a:noFill/>
+        </p:spPr>
+        <p:txBody>
+          <a:bodyPr wrap="none" rtlCol="0">
+            <a:spAutoFit/>
+          </a:bodyPr>
+          <a:lstStyle/>
+          <a:p>
+            <a:r>
+              <a:rPr lang="de-DE" sz="800" dirty="0">
+                <a:solidFill>
+                  <a:schemeClr val="bg1">
+                    <a:lumMod val="65000"/>
+                  </a:schemeClr>
+                </a:solidFill>
+              </a:rPr>
+              <a:t>https://grpc.io/docs/guides/</a:t>
+            </a:r>
+          </a:p>
+        </p:txBody>
+      </p:sp>
     </p:spTree>
     <p:extLst>
       <p:ext uri="{BB962C8B-B14F-4D97-AF65-F5344CB8AC3E}">
@@ -4055,7 +4107,7 @@
           <p:cNvPr id="2" name="Titel 1">
             <a:extLst>
               <a:ext uri="{FF2B5EF4-FFF2-40B4-BE49-F238E27FC236}">
-                <a16:creationId xmlns:a16="http://schemas.microsoft.com/office/drawing/2014/main" id="{33676A42-8111-4B36-9BCE-8479C458F09E}"/>
+                <a16:creationId xmlns:a16="http://schemas.microsoft.com/office/drawing/2014/main" id="{ACF44411-076C-4C54-A535-D3D96C30F66A}"/>
               </a:ext>
             </a:extLst>
           </p:cNvPr>
@@ -4073,7 +4125,7 @@
           <a:p>
             <a:r>
               <a:rPr lang="de-DE" dirty="0"/>
-              <a:t>gRPC – HTTP/2</a:t>
+              <a:t>gRPC - Allgemein</a:t>
             </a:r>
           </a:p>
         </p:txBody>
@@ -4083,7 +4135,7 @@
           <p:cNvPr id="3" name="Inhaltsplatzhalter 2">
             <a:extLst>
               <a:ext uri="{FF2B5EF4-FFF2-40B4-BE49-F238E27FC236}">
-                <a16:creationId xmlns:a16="http://schemas.microsoft.com/office/drawing/2014/main" id="{B92234DB-3FCC-4282-A3F6-6A649D2162A2}"/>
+                <a16:creationId xmlns:a16="http://schemas.microsoft.com/office/drawing/2014/main" id="{22551853-4284-44A6-B381-D5CB3B48123D}"/>
               </a:ext>
             </a:extLst>
           </p:cNvPr>
@@ -4100,40 +4152,27 @@
           <a:lstStyle/>
           <a:p>
             <a:r>
-              <a:rPr lang="de-DE" dirty="0" err="1"/>
-              <a:t>ServerPush</a:t>
-            </a:r>
-            <a:endParaRPr lang="de-DE" dirty="0"/>
-          </a:p>
-          <a:p>
-            <a:r>
               <a:rPr lang="de-DE" dirty="0"/>
-              <a:t>Kommunikation auf einem Kanal</a:t>
+              <a:t>Modernes RPC Framework</a:t>
             </a:r>
           </a:p>
           <a:p>
             <a:r>
               <a:rPr lang="de-DE" dirty="0"/>
-              <a:t>Stream Priorisierung</a:t>
+              <a:t>Server-Methodenaufrufe vom Client als wäre es ein lokales Objekt</a:t>
             </a:r>
           </a:p>
           <a:p>
             <a:r>
               <a:rPr lang="de-DE" dirty="0"/>
-              <a:t>Kompression des Headers</a:t>
-            </a:r>
-          </a:p>
-          <a:p>
-            <a:pPr marL="0" indent="0">
-              <a:buNone/>
-            </a:pPr>
-            <a:r>
-              <a:rPr lang="de-DE" dirty="0">
-                <a:sym typeface="Wingdings" panose="05000000000000000000" pitchFamily="2" charset="2"/>
-              </a:rPr>
-              <a:t> Höhere Geschwindigkeiten und weniger Overhead</a:t>
-            </a:r>
-            <a:endParaRPr lang="de-DE" dirty="0"/>
+              <a:t>HTTP/2</a:t>
+            </a:r>
+          </a:p>
+          <a:p>
+            <a:r>
+              <a:rPr lang="de-DE" dirty="0"/>
+              <a:t>Protocol Buffers</a:t>
+            </a:r>
           </a:p>
         </p:txBody>
       </p:sp>
@@ -4142,7 +4181,7 @@
           <p:cNvPr id="4" name="Foliennummernplatzhalter 3">
             <a:extLst>
               <a:ext uri="{FF2B5EF4-FFF2-40B4-BE49-F238E27FC236}">
-                <a16:creationId xmlns:a16="http://schemas.microsoft.com/office/drawing/2014/main" id="{F8EB6530-24B6-424B-A335-C58585EFE8ED}"/>
+                <a16:creationId xmlns:a16="http://schemas.microsoft.com/office/drawing/2014/main" id="{A5142650-CEC1-4B6D-9655-1CAB663B96C2}"/>
               </a:ext>
             </a:extLst>
           </p:cNvPr>
@@ -4171,7 +4210,7 @@
           <p:cNvPr id="5" name="Fußzeilenplatzhalter 4">
             <a:extLst>
               <a:ext uri="{FF2B5EF4-FFF2-40B4-BE49-F238E27FC236}">
-                <a16:creationId xmlns:a16="http://schemas.microsoft.com/office/drawing/2014/main" id="{DEA31A06-16E7-450C-B042-7DAA7CE0443A}"/>
+                <a16:creationId xmlns:a16="http://schemas.microsoft.com/office/drawing/2014/main" id="{D538B7A8-AA52-481D-8F67-3211596D5F42}"/>
               </a:ext>
             </a:extLst>
           </p:cNvPr>
@@ -4190,6 +4229,77 @@
             <a:r>
               <a:rPr lang="de-DE"/>
               <a:t>Fynn Klöpper - NodeJS &amp; API-Technologien</a:t>
+            </a:r>
+          </a:p>
+        </p:txBody>
+      </p:sp>
+      <p:pic>
+        <p:nvPicPr>
+          <p:cNvPr id="7" name="Grafik 6">
+            <a:extLst>
+              <a:ext uri="{FF2B5EF4-FFF2-40B4-BE49-F238E27FC236}">
+                <a16:creationId xmlns:a16="http://schemas.microsoft.com/office/drawing/2014/main" id="{1268D5C4-DA39-4316-B1C7-6165C28064CA}"/>
+              </a:ext>
+            </a:extLst>
+          </p:cNvPr>
+          <p:cNvPicPr>
+            <a:picLocks noChangeAspect="1"/>
+          </p:cNvPicPr>
+          <p:nvPr/>
+        </p:nvPicPr>
+        <p:blipFill>
+          <a:blip r:embed="rId2"/>
+          <a:stretch>
+            <a:fillRect/>
+          </a:stretch>
+        </p:blipFill>
+        <p:spPr>
+          <a:xfrm>
+            <a:off x="8952442" y="585216"/>
+            <a:ext cx="2371725" cy="1181100"/>
+          </a:xfrm>
+          <a:prstGeom prst="rect">
+            <a:avLst/>
+          </a:prstGeom>
+        </p:spPr>
+      </p:pic>
+      <p:sp>
+        <p:nvSpPr>
+          <p:cNvPr id="8" name="Textfeld 7">
+            <a:extLst>
+              <a:ext uri="{FF2B5EF4-FFF2-40B4-BE49-F238E27FC236}">
+                <a16:creationId xmlns:a16="http://schemas.microsoft.com/office/drawing/2014/main" id="{5712D2E6-8A55-4E8F-8C8E-E75775736257}"/>
+              </a:ext>
+            </a:extLst>
+          </p:cNvPr>
+          <p:cNvSpPr txBox="1"/>
+          <p:nvPr/>
+        </p:nvSpPr>
+        <p:spPr>
+          <a:xfrm>
+            <a:off x="9759577" y="1812391"/>
+            <a:ext cx="832279" cy="215444"/>
+          </a:xfrm>
+          <a:prstGeom prst="rect">
+            <a:avLst/>
+          </a:prstGeom>
+          <a:noFill/>
+        </p:spPr>
+        <p:txBody>
+          <a:bodyPr wrap="none" rtlCol="0">
+            <a:spAutoFit/>
+          </a:bodyPr>
+          <a:lstStyle/>
+          <a:p>
+            <a:r>
+              <a:rPr lang="de-DE" sz="800" dirty="0">
+                <a:solidFill>
+                  <a:schemeClr val="bg1">
+                    <a:lumMod val="65000"/>
+                  </a:schemeClr>
+                </a:solidFill>
+              </a:rPr>
+              <a:t>https://grpc.io/</a:t>
             </a:r>
           </a:p>
         </p:txBody>
@@ -4197,7 +4307,7 @@
     </p:spTree>
     <p:extLst>
       <p:ext uri="{BB962C8B-B14F-4D97-AF65-F5344CB8AC3E}">
-        <p14:creationId xmlns:p14="http://schemas.microsoft.com/office/powerpoint/2010/main" val="1278566733"/>
+        <p14:creationId xmlns:p14="http://schemas.microsoft.com/office/powerpoint/2010/main" val="989591214"/>
       </p:ext>
     </p:extLst>
   </p:cSld>
@@ -4229,7 +4339,7 @@
           <p:cNvPr id="2" name="Titel 1">
             <a:extLst>
               <a:ext uri="{FF2B5EF4-FFF2-40B4-BE49-F238E27FC236}">
-                <a16:creationId xmlns:a16="http://schemas.microsoft.com/office/drawing/2014/main" id="{3007D88C-91EA-4686-81BA-B8C2FAB60205}"/>
+                <a16:creationId xmlns:a16="http://schemas.microsoft.com/office/drawing/2014/main" id="{33676A42-8111-4B36-9BCE-8479C458F09E}"/>
               </a:ext>
             </a:extLst>
           </p:cNvPr>
@@ -4247,85 +4357,76 @@
           <a:p>
             <a:r>
               <a:rPr lang="de-DE" dirty="0"/>
-              <a:t>GRPC - </a:t>
-            </a:r>
+              <a:t>gRPC – HTTP/2</a:t>
+            </a:r>
+          </a:p>
+        </p:txBody>
+      </p:sp>
+      <p:sp>
+        <p:nvSpPr>
+          <p:cNvPr id="3" name="Inhaltsplatzhalter 2">
+            <a:extLst>
+              <a:ext uri="{FF2B5EF4-FFF2-40B4-BE49-F238E27FC236}">
+                <a16:creationId xmlns:a16="http://schemas.microsoft.com/office/drawing/2014/main" id="{B92234DB-3FCC-4282-A3F6-6A649D2162A2}"/>
+              </a:ext>
+            </a:extLst>
+          </p:cNvPr>
+          <p:cNvSpPr>
+            <a:spLocks noGrp="1"/>
+          </p:cNvSpPr>
+          <p:nvPr>
+            <p:ph idx="1"/>
+          </p:nvPr>
+        </p:nvSpPr>
+        <p:spPr/>
+        <p:txBody>
+          <a:bodyPr/>
+          <a:lstStyle/>
+          <a:p>
             <a:r>
               <a:rPr lang="de-DE" dirty="0" err="1"/>
               <a:t>ServerPush</a:t>
             </a:r>
             <a:endParaRPr lang="de-DE" dirty="0"/>
           </a:p>
-        </p:txBody>
-      </p:sp>
-      <p:pic>
-        <p:nvPicPr>
-          <p:cNvPr id="7" name="Inhaltsplatzhalter 6" descr="Ein Bild, das Text enthält.&#10;&#10;Mit hoher Zuverlässigkeit generierte Beschreibung">
-            <a:extLst>
-              <a:ext uri="{FF2B5EF4-FFF2-40B4-BE49-F238E27FC236}">
-                <a16:creationId xmlns:a16="http://schemas.microsoft.com/office/drawing/2014/main" id="{4583757E-5228-4D0F-8281-E521EFE1A242}"/>
-              </a:ext>
-            </a:extLst>
-          </p:cNvPr>
-          <p:cNvPicPr>
-            <a:picLocks noGrp="1" noChangeAspect="1"/>
-          </p:cNvPicPr>
-          <p:nvPr>
-            <p:ph idx="1"/>
-          </p:nvPr>
-        </p:nvPicPr>
-        <p:blipFill>
-          <a:blip r:embed="rId2">
-            <a:extLst>
-              <a:ext uri="{28A0092B-C50C-407E-A947-70E740481C1C}">
-                <a14:useLocalDpi xmlns:a14="http://schemas.microsoft.com/office/drawing/2010/main" val="0"/>
-              </a:ext>
-            </a:extLst>
-          </a:blip>
-          <a:stretch>
-            <a:fillRect/>
-          </a:stretch>
-        </p:blipFill>
-        <p:spPr>
-          <a:xfrm>
-            <a:off x="2012432" y="2286000"/>
-            <a:ext cx="7743273" cy="4022725"/>
-          </a:xfrm>
-        </p:spPr>
-      </p:pic>
-      <p:sp>
-        <p:nvSpPr>
-          <p:cNvPr id="4" name="Fußzeilenplatzhalter 3">
-            <a:extLst>
-              <a:ext uri="{FF2B5EF4-FFF2-40B4-BE49-F238E27FC236}">
-                <a16:creationId xmlns:a16="http://schemas.microsoft.com/office/drawing/2014/main" id="{2F9A7FA0-A77A-4F03-B9E5-45ED62FC2480}"/>
-              </a:ext>
-            </a:extLst>
-          </p:cNvPr>
-          <p:cNvSpPr>
-            <a:spLocks noGrp="1"/>
-          </p:cNvSpPr>
-          <p:nvPr>
-            <p:ph type="ftr" sz="quarter" idx="11"/>
-          </p:nvPr>
-        </p:nvSpPr>
-        <p:spPr/>
-        <p:txBody>
-          <a:bodyPr/>
-          <a:lstStyle/>
-          <a:p>
-            <a:r>
-              <a:rPr lang="de-DE"/>
-              <a:t>Fynn Klöpper - NodeJS &amp; API-Technologien</a:t>
-            </a:r>
-          </a:p>
-        </p:txBody>
-      </p:sp>
-      <p:sp>
-        <p:nvSpPr>
-          <p:cNvPr id="5" name="Foliennummernplatzhalter 4">
-            <a:extLst>
-              <a:ext uri="{FF2B5EF4-FFF2-40B4-BE49-F238E27FC236}">
-                <a16:creationId xmlns:a16="http://schemas.microsoft.com/office/drawing/2014/main" id="{F8633743-D719-49C8-A0B6-4471E3692A11}"/>
+          <a:p>
+            <a:r>
+              <a:rPr lang="de-DE" dirty="0"/>
+              <a:t>Kommunikation auf einem Kanal</a:t>
+            </a:r>
+          </a:p>
+          <a:p>
+            <a:r>
+              <a:rPr lang="de-DE" dirty="0"/>
+              <a:t>Stream Priorisierung</a:t>
+            </a:r>
+          </a:p>
+          <a:p>
+            <a:r>
+              <a:rPr lang="de-DE" dirty="0"/>
+              <a:t>Kompression des Headers</a:t>
+            </a:r>
+          </a:p>
+          <a:p>
+            <a:pPr marL="0" indent="0">
+              <a:buNone/>
+            </a:pPr>
+            <a:r>
+              <a:rPr lang="de-DE" dirty="0">
+                <a:sym typeface="Wingdings" panose="05000000000000000000" pitchFamily="2" charset="2"/>
+              </a:rPr>
+              <a:t> Höhere Geschwindigkeiten und weniger Overhead</a:t>
+            </a:r>
+            <a:endParaRPr lang="de-DE" dirty="0"/>
+          </a:p>
+        </p:txBody>
+      </p:sp>
+      <p:sp>
+        <p:nvSpPr>
+          <p:cNvPr id="4" name="Foliennummernplatzhalter 3">
+            <a:extLst>
+              <a:ext uri="{FF2B5EF4-FFF2-40B4-BE49-F238E27FC236}">
+                <a16:creationId xmlns:a16="http://schemas.microsoft.com/office/drawing/2014/main" id="{F8EB6530-24B6-424B-A335-C58585EFE8ED}"/>
               </a:ext>
             </a:extLst>
           </p:cNvPr>
@@ -4349,10 +4450,38 @@
           </a:p>
         </p:txBody>
       </p:sp>
+      <p:sp>
+        <p:nvSpPr>
+          <p:cNvPr id="5" name="Fußzeilenplatzhalter 4">
+            <a:extLst>
+              <a:ext uri="{FF2B5EF4-FFF2-40B4-BE49-F238E27FC236}">
+                <a16:creationId xmlns:a16="http://schemas.microsoft.com/office/drawing/2014/main" id="{DEA31A06-16E7-450C-B042-7DAA7CE0443A}"/>
+              </a:ext>
+            </a:extLst>
+          </p:cNvPr>
+          <p:cNvSpPr>
+            <a:spLocks noGrp="1"/>
+          </p:cNvSpPr>
+          <p:nvPr>
+            <p:ph type="ftr" sz="quarter" idx="11"/>
+          </p:nvPr>
+        </p:nvSpPr>
+        <p:spPr/>
+        <p:txBody>
+          <a:bodyPr/>
+          <a:lstStyle/>
+          <a:p>
+            <a:r>
+              <a:rPr lang="de-DE"/>
+              <a:t>Fynn Klöpper - NodeJS &amp; API-Technologien</a:t>
+            </a:r>
+          </a:p>
+        </p:txBody>
+      </p:sp>
     </p:spTree>
     <p:extLst>
       <p:ext uri="{BB962C8B-B14F-4D97-AF65-F5344CB8AC3E}">
-        <p14:creationId xmlns:p14="http://schemas.microsoft.com/office/powerpoint/2010/main" val="3458020238"/>
+        <p14:creationId xmlns:p14="http://schemas.microsoft.com/office/powerpoint/2010/main" val="1278566733"/>
       </p:ext>
     </p:extLst>
   </p:cSld>
@@ -4384,7 +4513,7 @@
           <p:cNvPr id="2" name="Titel 1">
             <a:extLst>
               <a:ext uri="{FF2B5EF4-FFF2-40B4-BE49-F238E27FC236}">
-                <a16:creationId xmlns:a16="http://schemas.microsoft.com/office/drawing/2014/main" id="{33676A42-8111-4B36-9BCE-8479C458F09E}"/>
+                <a16:creationId xmlns:a16="http://schemas.microsoft.com/office/drawing/2014/main" id="{3007D88C-91EA-4686-81BA-B8C2FAB60205}"/>
               </a:ext>
             </a:extLst>
           </p:cNvPr>
@@ -4402,76 +4531,85 @@
           <a:p>
             <a:r>
               <a:rPr lang="de-DE" dirty="0"/>
-              <a:t>gRPC – HTTP/2</a:t>
-            </a:r>
-          </a:p>
-        </p:txBody>
-      </p:sp>
-      <p:sp>
-        <p:nvSpPr>
-          <p:cNvPr id="3" name="Inhaltsplatzhalter 2">
-            <a:extLst>
-              <a:ext uri="{FF2B5EF4-FFF2-40B4-BE49-F238E27FC236}">
-                <a16:creationId xmlns:a16="http://schemas.microsoft.com/office/drawing/2014/main" id="{B92234DB-3FCC-4282-A3F6-6A649D2162A2}"/>
-              </a:ext>
-            </a:extLst>
-          </p:cNvPr>
-          <p:cNvSpPr>
-            <a:spLocks noGrp="1"/>
-          </p:cNvSpPr>
-          <p:nvPr>
-            <p:ph idx="1"/>
-          </p:nvPr>
-        </p:nvSpPr>
-        <p:spPr/>
-        <p:txBody>
-          <a:bodyPr/>
-          <a:lstStyle/>
-          <a:p>
+              <a:t>GRPC - </a:t>
+            </a:r>
             <a:r>
               <a:rPr lang="de-DE" dirty="0" err="1"/>
               <a:t>ServerPush</a:t>
             </a:r>
             <a:endParaRPr lang="de-DE" dirty="0"/>
           </a:p>
-          <a:p>
-            <a:r>
-              <a:rPr lang="de-DE" dirty="0"/>
-              <a:t>Kommunikation auf einem Kanal</a:t>
-            </a:r>
-          </a:p>
-          <a:p>
-            <a:r>
-              <a:rPr lang="de-DE" dirty="0"/>
-              <a:t>Stream Priorisierung</a:t>
-            </a:r>
-          </a:p>
-          <a:p>
-            <a:r>
-              <a:rPr lang="de-DE" dirty="0"/>
-              <a:t>Kompression des Headers</a:t>
-            </a:r>
-          </a:p>
-          <a:p>
-            <a:pPr marL="0" indent="0">
-              <a:buNone/>
-            </a:pPr>
-            <a:r>
-              <a:rPr lang="de-DE" dirty="0">
-                <a:sym typeface="Wingdings" panose="05000000000000000000" pitchFamily="2" charset="2"/>
-              </a:rPr>
-              <a:t> Höhere Geschwindigkeiten und weniger Overhead</a:t>
-            </a:r>
-            <a:endParaRPr lang="de-DE" dirty="0"/>
-          </a:p>
-        </p:txBody>
-      </p:sp>
-      <p:sp>
-        <p:nvSpPr>
-          <p:cNvPr id="4" name="Foliennummernplatzhalter 3">
-            <a:extLst>
-              <a:ext uri="{FF2B5EF4-FFF2-40B4-BE49-F238E27FC236}">
-                <a16:creationId xmlns:a16="http://schemas.microsoft.com/office/drawing/2014/main" id="{F8EB6530-24B6-424B-A335-C58585EFE8ED}"/>
+        </p:txBody>
+      </p:sp>
+      <p:pic>
+        <p:nvPicPr>
+          <p:cNvPr id="7" name="Inhaltsplatzhalter 6">
+            <a:extLst>
+              <a:ext uri="{FF2B5EF4-FFF2-40B4-BE49-F238E27FC236}">
+                <a16:creationId xmlns:a16="http://schemas.microsoft.com/office/drawing/2014/main" id="{4583757E-5228-4D0F-8281-E521EFE1A242}"/>
+              </a:ext>
+            </a:extLst>
+          </p:cNvPr>
+          <p:cNvPicPr>
+            <a:picLocks noGrp="1" noChangeAspect="1"/>
+          </p:cNvPicPr>
+          <p:nvPr>
+            <p:ph idx="1"/>
+          </p:nvPr>
+        </p:nvPicPr>
+        <p:blipFill>
+          <a:blip r:embed="rId2">
+            <a:extLst>
+              <a:ext uri="{28A0092B-C50C-407E-A947-70E740481C1C}">
+                <a14:useLocalDpi xmlns:a14="http://schemas.microsoft.com/office/drawing/2010/main" val="0"/>
+              </a:ext>
+            </a:extLst>
+          </a:blip>
+          <a:stretch>
+            <a:fillRect/>
+          </a:stretch>
+        </p:blipFill>
+        <p:spPr>
+          <a:xfrm>
+            <a:off x="3098738" y="2286000"/>
+            <a:ext cx="5570661" cy="4022725"/>
+          </a:xfrm>
+        </p:spPr>
+      </p:pic>
+      <p:sp>
+        <p:nvSpPr>
+          <p:cNvPr id="4" name="Fußzeilenplatzhalter 3">
+            <a:extLst>
+              <a:ext uri="{FF2B5EF4-FFF2-40B4-BE49-F238E27FC236}">
+                <a16:creationId xmlns:a16="http://schemas.microsoft.com/office/drawing/2014/main" id="{2F9A7FA0-A77A-4F03-B9E5-45ED62FC2480}"/>
+              </a:ext>
+            </a:extLst>
+          </p:cNvPr>
+          <p:cNvSpPr>
+            <a:spLocks noGrp="1"/>
+          </p:cNvSpPr>
+          <p:nvPr>
+            <p:ph type="ftr" sz="quarter" idx="11"/>
+          </p:nvPr>
+        </p:nvSpPr>
+        <p:spPr/>
+        <p:txBody>
+          <a:bodyPr/>
+          <a:lstStyle/>
+          <a:p>
+            <a:r>
+              <a:rPr lang="de-DE"/>
+              <a:t>Fynn Klöpper - NodeJS &amp; API-Technologien</a:t>
+            </a:r>
+          </a:p>
+        </p:txBody>
+      </p:sp>
+      <p:sp>
+        <p:nvSpPr>
+          <p:cNvPr id="5" name="Foliennummernplatzhalter 4">
+            <a:extLst>
+              <a:ext uri="{FF2B5EF4-FFF2-40B4-BE49-F238E27FC236}">
+                <a16:creationId xmlns:a16="http://schemas.microsoft.com/office/drawing/2014/main" id="{F8633743-D719-49C8-A0B6-4471E3692A11}"/>
               </a:ext>
             </a:extLst>
           </p:cNvPr>
@@ -4497,28 +4635,41 @@
       </p:sp>
       <p:sp>
         <p:nvSpPr>
-          <p:cNvPr id="5" name="Fußzeilenplatzhalter 4">
-            <a:extLst>
-              <a:ext uri="{FF2B5EF4-FFF2-40B4-BE49-F238E27FC236}">
-                <a16:creationId xmlns:a16="http://schemas.microsoft.com/office/drawing/2014/main" id="{DEA31A06-16E7-450C-B042-7DAA7CE0443A}"/>
-              </a:ext>
-            </a:extLst>
-          </p:cNvPr>
-          <p:cNvSpPr>
-            <a:spLocks noGrp="1"/>
-          </p:cNvSpPr>
-          <p:nvPr>
-            <p:ph type="ftr" sz="quarter" idx="11"/>
-          </p:nvPr>
-        </p:nvSpPr>
-        <p:spPr/>
-        <p:txBody>
-          <a:bodyPr/>
-          <a:lstStyle/>
-          <a:p>
-            <a:r>
-              <a:rPr lang="de-DE"/>
-              <a:t>Fynn Klöpper - NodeJS &amp; API-Technologien</a:t>
+          <p:cNvPr id="6" name="Textfeld 5">
+            <a:extLst>
+              <a:ext uri="{FF2B5EF4-FFF2-40B4-BE49-F238E27FC236}">
+                <a16:creationId xmlns:a16="http://schemas.microsoft.com/office/drawing/2014/main" id="{ED894BE0-E2C9-4455-8D15-5A889044181E}"/>
+              </a:ext>
+            </a:extLst>
+          </p:cNvPr>
+          <p:cNvSpPr txBox="1"/>
+          <p:nvPr/>
+        </p:nvSpPr>
+        <p:spPr>
+          <a:xfrm>
+            <a:off x="4488200" y="6357484"/>
+            <a:ext cx="2837636" cy="215444"/>
+          </a:xfrm>
+          <a:prstGeom prst="rect">
+            <a:avLst/>
+          </a:prstGeom>
+          <a:noFill/>
+        </p:spPr>
+        <p:txBody>
+          <a:bodyPr wrap="none" rtlCol="0">
+            <a:spAutoFit/>
+          </a:bodyPr>
+          <a:lstStyle/>
+          <a:p>
+            <a:r>
+              <a:rPr lang="de-DE" sz="800" dirty="0">
+                <a:solidFill>
+                  <a:schemeClr val="bg1">
+                    <a:lumMod val="65000"/>
+                  </a:schemeClr>
+                </a:solidFill>
+              </a:rPr>
+              <a:t>Geändert von https://ieeexplore.ieee.org/document/8264830/</a:t>
             </a:r>
           </a:p>
         </p:txBody>
@@ -4526,7 +4677,7 @@
     </p:spTree>
     <p:extLst>
       <p:ext uri="{BB962C8B-B14F-4D97-AF65-F5344CB8AC3E}">
-        <p14:creationId xmlns:p14="http://schemas.microsoft.com/office/powerpoint/2010/main" val="4256928026"/>
+        <p14:creationId xmlns:p14="http://schemas.microsoft.com/office/powerpoint/2010/main" val="3458020238"/>
       </p:ext>
     </p:extLst>
   </p:cSld>
@@ -4558,7 +4709,7 @@
           <p:cNvPr id="2" name="Titel 1">
             <a:extLst>
               <a:ext uri="{FF2B5EF4-FFF2-40B4-BE49-F238E27FC236}">
-                <a16:creationId xmlns:a16="http://schemas.microsoft.com/office/drawing/2014/main" id="{5C9E3680-E2CC-41B8-82F5-5341A0CF9A6F}"/>
+                <a16:creationId xmlns:a16="http://schemas.microsoft.com/office/drawing/2014/main" id="{33676A42-8111-4B36-9BCE-8479C458F09E}"/>
               </a:ext>
             </a:extLst>
           </p:cNvPr>
@@ -4576,17 +4727,17 @@
           <a:p>
             <a:r>
               <a:rPr lang="de-DE" dirty="0"/>
-              <a:t>gRPC – Protocol Buffers</a:t>
-            </a:r>
-          </a:p>
-        </p:txBody>
-      </p:sp>
-      <p:sp>
-        <p:nvSpPr>
-          <p:cNvPr id="7" name="Inhaltsplatzhalter 6">
-            <a:extLst>
-              <a:ext uri="{FF2B5EF4-FFF2-40B4-BE49-F238E27FC236}">
-                <a16:creationId xmlns:a16="http://schemas.microsoft.com/office/drawing/2014/main" id="{24645A32-2FBE-48A6-A09A-89699DF7AA6F}"/>
+              <a:t>gRPC – HTTP/2</a:t>
+            </a:r>
+          </a:p>
+        </p:txBody>
+      </p:sp>
+      <p:sp>
+        <p:nvSpPr>
+          <p:cNvPr id="3" name="Inhaltsplatzhalter 2">
+            <a:extLst>
+              <a:ext uri="{FF2B5EF4-FFF2-40B4-BE49-F238E27FC236}">
+                <a16:creationId xmlns:a16="http://schemas.microsoft.com/office/drawing/2014/main" id="{B92234DB-3FCC-4282-A3F6-6A649D2162A2}"/>
               </a:ext>
             </a:extLst>
           </p:cNvPr>
@@ -4603,60 +4754,49 @@
           <a:lstStyle/>
           <a:p>
             <a:r>
+              <a:rPr lang="de-DE" dirty="0" err="1"/>
+              <a:t>ServerPush</a:t>
+            </a:r>
+            <a:endParaRPr lang="de-DE" dirty="0"/>
+          </a:p>
+          <a:p>
+            <a:r>
               <a:rPr lang="de-DE" dirty="0"/>
-              <a:t>Serialisierung strukturierter Daten</a:t>
+              <a:t>Kommunikation auf einem Kanal</a:t>
             </a:r>
           </a:p>
           <a:p>
             <a:r>
               <a:rPr lang="de-DE" dirty="0"/>
-              <a:t>Ähnlich zu JSON/XML</a:t>
+              <a:t>Stream Priorisierung</a:t>
             </a:r>
           </a:p>
           <a:p>
             <a:r>
               <a:rPr lang="de-DE" dirty="0"/>
-              <a:t>Generiert Klassen mit Getter-/Setter-Methoden</a:t>
-            </a:r>
-          </a:p>
-        </p:txBody>
-      </p:sp>
-      <p:pic>
-        <p:nvPicPr>
-          <p:cNvPr id="8" name="Inhaltsplatzhalter 5">
-            <a:extLst>
-              <a:ext uri="{FF2B5EF4-FFF2-40B4-BE49-F238E27FC236}">
-                <a16:creationId xmlns:a16="http://schemas.microsoft.com/office/drawing/2014/main" id="{ED82FF89-7686-4C4F-926B-23D8EF5307B9}"/>
-              </a:ext>
-            </a:extLst>
-          </p:cNvPr>
-          <p:cNvPicPr>
-            <a:picLocks noChangeAspect="1"/>
-          </p:cNvPicPr>
-          <p:nvPr/>
-        </p:nvPicPr>
-        <p:blipFill>
-          <a:blip r:embed="rId2"/>
-          <a:stretch>
-            <a:fillRect/>
-          </a:stretch>
-        </p:blipFill>
-        <p:spPr>
-          <a:xfrm>
-            <a:off x="4228336" y="3724502"/>
-            <a:ext cx="3735328" cy="2587398"/>
-          </a:xfrm>
-          <a:prstGeom prst="rect">
-            <a:avLst/>
-          </a:prstGeom>
-        </p:spPr>
-      </p:pic>
-      <p:sp>
-        <p:nvSpPr>
-          <p:cNvPr id="9" name="Foliennummernplatzhalter 8">
-            <a:extLst>
-              <a:ext uri="{FF2B5EF4-FFF2-40B4-BE49-F238E27FC236}">
-                <a16:creationId xmlns:a16="http://schemas.microsoft.com/office/drawing/2014/main" id="{E082E0C8-BF33-4CF3-9324-400D14E4C8A2}"/>
+              <a:t>Kompression des Headers</a:t>
+            </a:r>
+          </a:p>
+          <a:p>
+            <a:pPr marL="0" indent="0">
+              <a:buNone/>
+            </a:pPr>
+            <a:r>
+              <a:rPr lang="de-DE" dirty="0">
+                <a:sym typeface="Wingdings" panose="05000000000000000000" pitchFamily="2" charset="2"/>
+              </a:rPr>
+              <a:t> Höhere Geschwindigkeiten und weniger Overhead</a:t>
+            </a:r>
+            <a:endParaRPr lang="de-DE" dirty="0"/>
+          </a:p>
+        </p:txBody>
+      </p:sp>
+      <p:sp>
+        <p:nvSpPr>
+          <p:cNvPr id="4" name="Foliennummernplatzhalter 3">
+            <a:extLst>
+              <a:ext uri="{FF2B5EF4-FFF2-40B4-BE49-F238E27FC236}">
+                <a16:creationId xmlns:a16="http://schemas.microsoft.com/office/drawing/2014/main" id="{F8EB6530-24B6-424B-A335-C58585EFE8ED}"/>
               </a:ext>
             </a:extLst>
           </p:cNvPr>
@@ -4682,10 +4822,10 @@
       </p:sp>
       <p:sp>
         <p:nvSpPr>
-          <p:cNvPr id="10" name="Fußzeilenplatzhalter 9">
-            <a:extLst>
-              <a:ext uri="{FF2B5EF4-FFF2-40B4-BE49-F238E27FC236}">
-                <a16:creationId xmlns:a16="http://schemas.microsoft.com/office/drawing/2014/main" id="{48EF6C5F-5ADF-40EE-B8B0-75FFF4F48CEC}"/>
+          <p:cNvPr id="5" name="Fußzeilenplatzhalter 4">
+            <a:extLst>
+              <a:ext uri="{FF2B5EF4-FFF2-40B4-BE49-F238E27FC236}">
+                <a16:creationId xmlns:a16="http://schemas.microsoft.com/office/drawing/2014/main" id="{DEA31A06-16E7-450C-B042-7DAA7CE0443A}"/>
               </a:ext>
             </a:extLst>
           </p:cNvPr>
@@ -4711,7 +4851,7 @@
     </p:spTree>
     <p:extLst>
       <p:ext uri="{BB962C8B-B14F-4D97-AF65-F5344CB8AC3E}">
-        <p14:creationId xmlns:p14="http://schemas.microsoft.com/office/powerpoint/2010/main" val="2435037741"/>
+        <p14:creationId xmlns:p14="http://schemas.microsoft.com/office/powerpoint/2010/main" val="4256928026"/>
       </p:ext>
     </p:extLst>
   </p:cSld>
@@ -4743,7 +4883,7 @@
           <p:cNvPr id="2" name="Titel 1">
             <a:extLst>
               <a:ext uri="{FF2B5EF4-FFF2-40B4-BE49-F238E27FC236}">
-                <a16:creationId xmlns:a16="http://schemas.microsoft.com/office/drawing/2014/main" id="{D7123FFE-0412-4016-ACD4-176D6435FCF7}"/>
+                <a16:creationId xmlns:a16="http://schemas.microsoft.com/office/drawing/2014/main" id="{5C9E3680-E2CC-41B8-82F5-5341A0CF9A6F}"/>
               </a:ext>
             </a:extLst>
           </p:cNvPr>
@@ -4761,17 +4901,17 @@
           <a:p>
             <a:r>
               <a:rPr lang="de-DE" dirty="0"/>
-              <a:t>gRPC – Vorteile	</a:t>
-            </a:r>
-          </a:p>
-        </p:txBody>
-      </p:sp>
-      <p:sp>
-        <p:nvSpPr>
-          <p:cNvPr id="3" name="Inhaltsplatzhalter 2">
-            <a:extLst>
-              <a:ext uri="{FF2B5EF4-FFF2-40B4-BE49-F238E27FC236}">
-                <a16:creationId xmlns:a16="http://schemas.microsoft.com/office/drawing/2014/main" id="{D4B020BD-94DF-4B9D-BAFF-FB52479114ED}"/>
+              <a:t>gRPC – Protocol Buffers</a:t>
+            </a:r>
+          </a:p>
+        </p:txBody>
+      </p:sp>
+      <p:sp>
+        <p:nvSpPr>
+          <p:cNvPr id="7" name="Inhaltsplatzhalter 6">
+            <a:extLst>
+              <a:ext uri="{FF2B5EF4-FFF2-40B4-BE49-F238E27FC236}">
+                <a16:creationId xmlns:a16="http://schemas.microsoft.com/office/drawing/2014/main" id="{24645A32-2FBE-48A6-A09A-89699DF7AA6F}"/>
               </a:ext>
             </a:extLst>
           </p:cNvPr>
@@ -4789,23 +4929,74 @@
           <a:p>
             <a:r>
               <a:rPr lang="de-DE" dirty="0"/>
-              <a:t>Performance </a:t>
+              <a:t>Serialisierung strukturierter Daten</a:t>
             </a:r>
           </a:p>
           <a:p>
             <a:r>
               <a:rPr lang="de-DE" dirty="0"/>
-              <a:t>Geringe Datengröße</a:t>
-            </a:r>
-          </a:p>
-        </p:txBody>
-      </p:sp>
-      <p:sp>
-        <p:nvSpPr>
-          <p:cNvPr id="4" name="Foliennummernplatzhalter 3">
-            <a:extLst>
-              <a:ext uri="{FF2B5EF4-FFF2-40B4-BE49-F238E27FC236}">
-                <a16:creationId xmlns:a16="http://schemas.microsoft.com/office/drawing/2014/main" id="{CC5D2058-2C09-4AE3-9E31-0567EAB1714C}"/>
+              <a:t>Ähnlich zu JSON/XML</a:t>
+            </a:r>
+          </a:p>
+          <a:p>
+            <a:r>
+              <a:rPr lang="de-DE" dirty="0"/>
+              <a:t>Generiert Klassen mit Getter-/Setter-Methoden</a:t>
+            </a:r>
+          </a:p>
+          <a:p>
+            <a:r>
+              <a:rPr lang="de-DE" dirty="0"/>
+              <a:t>Umwandlung in Binärformat zur Übertragung</a:t>
+            </a:r>
+          </a:p>
+          <a:p>
+            <a:r>
+              <a:rPr lang="de-DE" dirty="0">
+                <a:sym typeface="Wingdings" panose="05000000000000000000" pitchFamily="2" charset="2"/>
+              </a:rPr>
+              <a:t> Kleinere und schnellere Datenübertragung</a:t>
+            </a:r>
+            <a:endParaRPr lang="de-DE" dirty="0"/>
+          </a:p>
+        </p:txBody>
+      </p:sp>
+      <p:pic>
+        <p:nvPicPr>
+          <p:cNvPr id="8" name="Inhaltsplatzhalter 5">
+            <a:extLst>
+              <a:ext uri="{FF2B5EF4-FFF2-40B4-BE49-F238E27FC236}">
+                <a16:creationId xmlns:a16="http://schemas.microsoft.com/office/drawing/2014/main" id="{ED82FF89-7686-4C4F-926B-23D8EF5307B9}"/>
+              </a:ext>
+            </a:extLst>
+          </p:cNvPr>
+          <p:cNvPicPr>
+            <a:picLocks noChangeAspect="1"/>
+          </p:cNvPicPr>
+          <p:nvPr/>
+        </p:nvPicPr>
+        <p:blipFill>
+          <a:blip r:embed="rId2"/>
+          <a:stretch>
+            <a:fillRect/>
+          </a:stretch>
+        </p:blipFill>
+        <p:spPr>
+          <a:xfrm>
+            <a:off x="7525451" y="2124656"/>
+            <a:ext cx="3735328" cy="2587398"/>
+          </a:xfrm>
+          <a:prstGeom prst="rect">
+            <a:avLst/>
+          </a:prstGeom>
+        </p:spPr>
+      </p:pic>
+      <p:sp>
+        <p:nvSpPr>
+          <p:cNvPr id="9" name="Foliennummernplatzhalter 8">
+            <a:extLst>
+              <a:ext uri="{FF2B5EF4-FFF2-40B4-BE49-F238E27FC236}">
+                <a16:creationId xmlns:a16="http://schemas.microsoft.com/office/drawing/2014/main" id="{E082E0C8-BF33-4CF3-9324-400D14E4C8A2}"/>
               </a:ext>
             </a:extLst>
           </p:cNvPr>
@@ -4831,10 +5022,10 @@
       </p:sp>
       <p:sp>
         <p:nvSpPr>
-          <p:cNvPr id="5" name="Fußzeilenplatzhalter 4">
-            <a:extLst>
-              <a:ext uri="{FF2B5EF4-FFF2-40B4-BE49-F238E27FC236}">
-                <a16:creationId xmlns:a16="http://schemas.microsoft.com/office/drawing/2014/main" id="{54876322-3E5C-473A-93FF-EA426F28D8C5}"/>
+          <p:cNvPr id="10" name="Fußzeilenplatzhalter 9">
+            <a:extLst>
+              <a:ext uri="{FF2B5EF4-FFF2-40B4-BE49-F238E27FC236}">
+                <a16:creationId xmlns:a16="http://schemas.microsoft.com/office/drawing/2014/main" id="{48EF6C5F-5ADF-40EE-B8B0-75FFF4F48CEC}"/>
               </a:ext>
             </a:extLst>
           </p:cNvPr>
@@ -4860,7 +5051,7 @@
     </p:spTree>
     <p:extLst>
       <p:ext uri="{BB962C8B-B14F-4D97-AF65-F5344CB8AC3E}">
-        <p14:creationId xmlns:p14="http://schemas.microsoft.com/office/powerpoint/2010/main" val="2516696959"/>
+        <p14:creationId xmlns:p14="http://schemas.microsoft.com/office/powerpoint/2010/main" val="2435037741"/>
       </p:ext>
     </p:extLst>
   </p:cSld>
@@ -4892,7 +5083,7 @@
           <p:cNvPr id="2" name="Titel 1">
             <a:extLst>
               <a:ext uri="{FF2B5EF4-FFF2-40B4-BE49-F238E27FC236}">
-                <a16:creationId xmlns:a16="http://schemas.microsoft.com/office/drawing/2014/main" id="{E5369C83-7FB0-4581-9553-DB44D9618093}"/>
+                <a16:creationId xmlns:a16="http://schemas.microsoft.com/office/drawing/2014/main" id="{D7123FFE-0412-4016-ACD4-176D6435FCF7}"/>
               </a:ext>
             </a:extLst>
           </p:cNvPr>
@@ -4910,7 +5101,7 @@
           <a:p>
             <a:r>
               <a:rPr lang="de-DE" dirty="0"/>
-              <a:t>gRPC – Nachteile		</a:t>
+              <a:t>gRPC – Vorteile	</a:t>
             </a:r>
           </a:p>
         </p:txBody>
@@ -4920,7 +5111,7 @@
           <p:cNvPr id="3" name="Inhaltsplatzhalter 2">
             <a:extLst>
               <a:ext uri="{FF2B5EF4-FFF2-40B4-BE49-F238E27FC236}">
-                <a16:creationId xmlns:a16="http://schemas.microsoft.com/office/drawing/2014/main" id="{03DA1705-1692-4CBC-836E-56202067DA66}"/>
+                <a16:creationId xmlns:a16="http://schemas.microsoft.com/office/drawing/2014/main" id="{D4B020BD-94DF-4B9D-BAFF-FB52479114ED}"/>
               </a:ext>
             </a:extLst>
           </p:cNvPr>
@@ -4938,21 +5129,13 @@
           <a:p>
             <a:r>
               <a:rPr lang="de-DE" dirty="0"/>
-              <a:t>Browserinkompatibilität</a:t>
-            </a:r>
-          </a:p>
-          <a:p>
-            <a:pPr lvl="1"/>
+              <a:t>Performance </a:t>
+            </a:r>
+          </a:p>
+          <a:p>
             <a:r>
               <a:rPr lang="de-DE" dirty="0"/>
-              <a:t>Aktuelle gRPC-Bibliotheken durch technische Limitierungen beschränkt</a:t>
-            </a:r>
-          </a:p>
-          <a:p>
-            <a:pPr lvl="1"/>
-            <a:r>
-              <a:rPr lang="de-DE" dirty="0"/>
-              <a:t>Proxydienst </a:t>
+              <a:t>Geringe Datengröße</a:t>
             </a:r>
           </a:p>
         </p:txBody>
@@ -4962,7 +5145,7 @@
           <p:cNvPr id="4" name="Foliennummernplatzhalter 3">
             <a:extLst>
               <a:ext uri="{FF2B5EF4-FFF2-40B4-BE49-F238E27FC236}">
-                <a16:creationId xmlns:a16="http://schemas.microsoft.com/office/drawing/2014/main" id="{B8EDA77D-7CFA-461B-B492-A54136B357EE}"/>
+                <a16:creationId xmlns:a16="http://schemas.microsoft.com/office/drawing/2014/main" id="{CC5D2058-2C09-4AE3-9E31-0567EAB1714C}"/>
               </a:ext>
             </a:extLst>
           </p:cNvPr>
@@ -4991,7 +5174,7 @@
           <p:cNvPr id="5" name="Fußzeilenplatzhalter 4">
             <a:extLst>
               <a:ext uri="{FF2B5EF4-FFF2-40B4-BE49-F238E27FC236}">
-                <a16:creationId xmlns:a16="http://schemas.microsoft.com/office/drawing/2014/main" id="{C495A541-5FCB-4238-91F2-E8613F71F341}"/>
+                <a16:creationId xmlns:a16="http://schemas.microsoft.com/office/drawing/2014/main" id="{54876322-3E5C-473A-93FF-EA426F28D8C5}"/>
               </a:ext>
             </a:extLst>
           </p:cNvPr>
@@ -5017,7 +5200,7 @@
     </p:spTree>
     <p:extLst>
       <p:ext uri="{BB962C8B-B14F-4D97-AF65-F5344CB8AC3E}">
-        <p14:creationId xmlns:p14="http://schemas.microsoft.com/office/powerpoint/2010/main" val="3892752558"/>
+        <p14:creationId xmlns:p14="http://schemas.microsoft.com/office/powerpoint/2010/main" val="2516696959"/>
       </p:ext>
     </p:extLst>
   </p:cSld>
@@ -5049,7 +5232,7 @@
           <p:cNvPr id="2" name="Titel 1">
             <a:extLst>
               <a:ext uri="{FF2B5EF4-FFF2-40B4-BE49-F238E27FC236}">
-                <a16:creationId xmlns:a16="http://schemas.microsoft.com/office/drawing/2014/main" id="{8D2E03BE-CD39-4F7C-8967-035C898F9EE5}"/>
+                <a16:creationId xmlns:a16="http://schemas.microsoft.com/office/drawing/2014/main" id="{E5369C83-7FB0-4581-9553-DB44D9618093}"/>
               </a:ext>
             </a:extLst>
           </p:cNvPr>
@@ -5067,7 +5250,7 @@
           <a:p>
             <a:r>
               <a:rPr lang="de-DE" dirty="0"/>
-              <a:t>REST - Allgemein</a:t>
+              <a:t>gRPC – Nachteile		</a:t>
             </a:r>
           </a:p>
         </p:txBody>
@@ -5077,7 +5260,7 @@
           <p:cNvPr id="3" name="Inhaltsplatzhalter 2">
             <a:extLst>
               <a:ext uri="{FF2B5EF4-FFF2-40B4-BE49-F238E27FC236}">
-                <a16:creationId xmlns:a16="http://schemas.microsoft.com/office/drawing/2014/main" id="{376AB494-AB1D-416A-AC7F-C3424B00B075}"/>
+                <a16:creationId xmlns:a16="http://schemas.microsoft.com/office/drawing/2014/main" id="{03DA1705-1692-4CBC-836E-56202067DA66}"/>
               </a:ext>
             </a:extLst>
           </p:cNvPr>
@@ -5095,47 +5278,21 @@
           <a:p>
             <a:r>
               <a:rPr lang="de-DE" dirty="0"/>
-              <a:t>Bewährte API-Technologie</a:t>
-            </a:r>
-          </a:p>
-          <a:p>
+              <a:t>Browserinkompatibilität</a:t>
+            </a:r>
+          </a:p>
+          <a:p>
+            <a:pPr lvl="1"/>
             <a:r>
               <a:rPr lang="de-DE" dirty="0"/>
-              <a:t>Seit 2000 von Roy Fielding</a:t>
-            </a:r>
-          </a:p>
-          <a:p>
+              <a:t>Aktuelle gRPC-Bibliotheken durch technische Limitierungen beschränkt</a:t>
+            </a:r>
+          </a:p>
+          <a:p>
+            <a:pPr lvl="1"/>
             <a:r>
               <a:rPr lang="de-DE" dirty="0"/>
-              <a:t>Kommunikation über HTTP-Anfragen</a:t>
-            </a:r>
-          </a:p>
-          <a:p>
-            <a:pPr lvl="1"/>
-            <a:r>
-              <a:rPr lang="de-DE" dirty="0"/>
-              <a:t>GET</a:t>
-            </a:r>
-          </a:p>
-          <a:p>
-            <a:pPr lvl="1"/>
-            <a:r>
-              <a:rPr lang="de-DE" dirty="0"/>
-              <a:t>POST</a:t>
-            </a:r>
-          </a:p>
-          <a:p>
-            <a:pPr lvl="1"/>
-            <a:r>
-              <a:rPr lang="de-DE" dirty="0"/>
-              <a:t>PUT</a:t>
-            </a:r>
-          </a:p>
-          <a:p>
-            <a:pPr lvl="1"/>
-            <a:r>
-              <a:rPr lang="de-DE" dirty="0"/>
-              <a:t>DELETE</a:t>
+              <a:t>Proxydienst </a:t>
             </a:r>
           </a:p>
         </p:txBody>
@@ -5145,7 +5302,7 @@
           <p:cNvPr id="4" name="Foliennummernplatzhalter 3">
             <a:extLst>
               <a:ext uri="{FF2B5EF4-FFF2-40B4-BE49-F238E27FC236}">
-                <a16:creationId xmlns:a16="http://schemas.microsoft.com/office/drawing/2014/main" id="{9DC7D920-1A03-4657-A9D8-D222D2256E27}"/>
+                <a16:creationId xmlns:a16="http://schemas.microsoft.com/office/drawing/2014/main" id="{B8EDA77D-7CFA-461B-B492-A54136B357EE}"/>
               </a:ext>
             </a:extLst>
           </p:cNvPr>
@@ -5174,7 +5331,7 @@
           <p:cNvPr id="5" name="Fußzeilenplatzhalter 4">
             <a:extLst>
               <a:ext uri="{FF2B5EF4-FFF2-40B4-BE49-F238E27FC236}">
-                <a16:creationId xmlns:a16="http://schemas.microsoft.com/office/drawing/2014/main" id="{1A7EE7F0-A714-4331-99FB-E1B6346A4DA7}"/>
+                <a16:creationId xmlns:a16="http://schemas.microsoft.com/office/drawing/2014/main" id="{C495A541-5FCB-4238-91F2-E8613F71F341}"/>
               </a:ext>
             </a:extLst>
           </p:cNvPr>
@@ -5200,7 +5357,7 @@
     </p:spTree>
     <p:extLst>
       <p:ext uri="{BB962C8B-B14F-4D97-AF65-F5344CB8AC3E}">
-        <p14:creationId xmlns:p14="http://schemas.microsoft.com/office/powerpoint/2010/main" val="3601629058"/>
+        <p14:creationId xmlns:p14="http://schemas.microsoft.com/office/powerpoint/2010/main" val="3892752558"/>
       </p:ext>
     </p:extLst>
   </p:cSld>
@@ -5232,7 +5389,7 @@
           <p:cNvPr id="2" name="Titel 1">
             <a:extLst>
               <a:ext uri="{FF2B5EF4-FFF2-40B4-BE49-F238E27FC236}">
-                <a16:creationId xmlns:a16="http://schemas.microsoft.com/office/drawing/2014/main" id="{FEBDAE2A-7051-4A5C-B9C9-ACB668E7FAB0}"/>
+                <a16:creationId xmlns:a16="http://schemas.microsoft.com/office/drawing/2014/main" id="{8D2E03BE-CD39-4F7C-8967-035C898F9EE5}"/>
               </a:ext>
             </a:extLst>
           </p:cNvPr>
@@ -5250,7 +5407,7 @@
           <a:p>
             <a:r>
               <a:rPr lang="de-DE" dirty="0"/>
-              <a:t>REST – Sechs Prinzipien</a:t>
+              <a:t>REST - Allgemein</a:t>
             </a:r>
           </a:p>
         </p:txBody>
@@ -5260,7 +5417,7 @@
           <p:cNvPr id="3" name="Inhaltsplatzhalter 2">
             <a:extLst>
               <a:ext uri="{FF2B5EF4-FFF2-40B4-BE49-F238E27FC236}">
-                <a16:creationId xmlns:a16="http://schemas.microsoft.com/office/drawing/2014/main" id="{F382C999-BE79-4827-B4DA-F95A34878170}"/>
+                <a16:creationId xmlns:a16="http://schemas.microsoft.com/office/drawing/2014/main" id="{376AB494-AB1D-416A-AC7F-C3424B00B075}"/>
               </a:ext>
             </a:extLst>
           </p:cNvPr>
@@ -5278,44 +5435,61 @@
           <a:p>
             <a:r>
               <a:rPr lang="de-DE" dirty="0"/>
-              <a:t>Client-Server</a:t>
-            </a:r>
-          </a:p>
-          <a:p>
-            <a:r>
-              <a:rPr lang="de-DE" dirty="0" err="1"/>
-              <a:t>Stateless</a:t>
-            </a:r>
+              <a:t>Bewährte API-Technologie</a:t>
+            </a:r>
+          </a:p>
+          <a:p>
+            <a:r>
+              <a:rPr lang="de-DE" dirty="0"/>
+              <a:t>Seit 2000 von Roy Fielding</a:t>
+            </a:r>
+          </a:p>
+          <a:p>
+            <a:r>
+              <a:rPr lang="de-DE" dirty="0"/>
+              <a:t>Kommunikation über HTTP-Anfragen</a:t>
+            </a:r>
+          </a:p>
+          <a:p>
+            <a:pPr lvl="1"/>
+            <a:r>
+              <a:rPr lang="de-DE" dirty="0"/>
+              <a:t>GET</a:t>
+            </a:r>
+          </a:p>
+          <a:p>
+            <a:pPr lvl="1"/>
+            <a:r>
+              <a:rPr lang="de-DE" dirty="0"/>
+              <a:t>POST</a:t>
+            </a:r>
+          </a:p>
+          <a:p>
+            <a:pPr lvl="1"/>
+            <a:r>
+              <a:rPr lang="de-DE" dirty="0"/>
+              <a:t>PUT</a:t>
+            </a:r>
+          </a:p>
+          <a:p>
+            <a:pPr lvl="1"/>
+            <a:r>
+              <a:rPr lang="de-DE" dirty="0"/>
+              <a:t>DELETE</a:t>
+            </a:r>
+          </a:p>
+          <a:p>
+            <a:r>
+              <a:rPr lang="de-DE" dirty="0"/>
+              <a:t>Sechs Prinzipien</a:t>
+            </a:r>
+          </a:p>
+          <a:p>
+            <a:pPr marL="128016" lvl="1" indent="0">
+              <a:buNone/>
+            </a:pPr>
             <a:endParaRPr lang="de-DE" dirty="0"/>
           </a:p>
-          <a:p>
-            <a:r>
-              <a:rPr lang="de-DE" dirty="0"/>
-              <a:t>Cache</a:t>
-            </a:r>
-          </a:p>
-          <a:p>
-            <a:r>
-              <a:rPr lang="de-DE" dirty="0"/>
-              <a:t>Uniform-Interface inkl. HATEOAS</a:t>
-            </a:r>
-          </a:p>
-          <a:p>
-            <a:r>
-              <a:rPr lang="de-DE" dirty="0" err="1"/>
-              <a:t>Layered</a:t>
-            </a:r>
-            <a:r>
-              <a:rPr lang="de-DE" dirty="0"/>
-              <a:t> System</a:t>
-            </a:r>
-          </a:p>
-          <a:p>
-            <a:r>
-              <a:rPr lang="de-DE" dirty="0"/>
-              <a:t>Optional: Code-On-Demand</a:t>
-            </a:r>
-          </a:p>
         </p:txBody>
       </p:sp>
       <p:sp>
@@ -5323,7 +5497,7 @@
           <p:cNvPr id="4" name="Foliennummernplatzhalter 3">
             <a:extLst>
               <a:ext uri="{FF2B5EF4-FFF2-40B4-BE49-F238E27FC236}">
-                <a16:creationId xmlns:a16="http://schemas.microsoft.com/office/drawing/2014/main" id="{CDABA042-AE04-4822-8AB0-832C400E8BAA}"/>
+                <a16:creationId xmlns:a16="http://schemas.microsoft.com/office/drawing/2014/main" id="{9DC7D920-1A03-4657-A9D8-D222D2256E27}"/>
               </a:ext>
             </a:extLst>
           </p:cNvPr>
@@ -5352,7 +5526,7 @@
           <p:cNvPr id="5" name="Fußzeilenplatzhalter 4">
             <a:extLst>
               <a:ext uri="{FF2B5EF4-FFF2-40B4-BE49-F238E27FC236}">
-                <a16:creationId xmlns:a16="http://schemas.microsoft.com/office/drawing/2014/main" id="{12BA50BB-0F47-436E-A11A-2D8A7B6832EF}"/>
+                <a16:creationId xmlns:a16="http://schemas.microsoft.com/office/drawing/2014/main" id="{1A7EE7F0-A714-4331-99FB-E1B6346A4DA7}"/>
               </a:ext>
             </a:extLst>
           </p:cNvPr>
@@ -5378,7 +5552,7 @@
     </p:spTree>
     <p:extLst>
       <p:ext uri="{BB962C8B-B14F-4D97-AF65-F5344CB8AC3E}">
-        <p14:creationId xmlns:p14="http://schemas.microsoft.com/office/powerpoint/2010/main" val="581448656"/>
+        <p14:creationId xmlns:p14="http://schemas.microsoft.com/office/powerpoint/2010/main" val="3601629058"/>
       </p:ext>
     </p:extLst>
   </p:cSld>
@@ -5410,7 +5584,7 @@
           <p:cNvPr id="2" name="Titel 1">
             <a:extLst>
               <a:ext uri="{FF2B5EF4-FFF2-40B4-BE49-F238E27FC236}">
-                <a16:creationId xmlns:a16="http://schemas.microsoft.com/office/drawing/2014/main" id="{C60DCF6D-DFC3-41E1-BA88-32A1F44B82F0}"/>
+                <a16:creationId xmlns:a16="http://schemas.microsoft.com/office/drawing/2014/main" id="{238F2B14-0273-4B56-A1C7-3C504537676C}"/>
               </a:ext>
             </a:extLst>
           </p:cNvPr>
@@ -5428,51 +5602,80 @@
           <a:p>
             <a:r>
               <a:rPr lang="de-DE" dirty="0"/>
-              <a:t>REST – Vorteile	</a:t>
-            </a:r>
-          </a:p>
-        </p:txBody>
-      </p:sp>
-      <p:sp>
-        <p:nvSpPr>
-          <p:cNvPr id="3" name="Inhaltsplatzhalter 2">
-            <a:extLst>
-              <a:ext uri="{FF2B5EF4-FFF2-40B4-BE49-F238E27FC236}">
-                <a16:creationId xmlns:a16="http://schemas.microsoft.com/office/drawing/2014/main" id="{704CFC4F-BC3F-460C-9A33-FB4D07DB058F}"/>
-              </a:ext>
-            </a:extLst>
-          </p:cNvPr>
-          <p:cNvSpPr>
-            <a:spLocks noGrp="1"/>
-          </p:cNvSpPr>
+              <a:t>REST – Client – Server 1/6</a:t>
+            </a:r>
+          </a:p>
+        </p:txBody>
+      </p:sp>
+      <p:pic>
+        <p:nvPicPr>
+          <p:cNvPr id="7" name="Inhaltsplatzhalter 6">
+            <a:extLst>
+              <a:ext uri="{FF2B5EF4-FFF2-40B4-BE49-F238E27FC236}">
+                <a16:creationId xmlns:a16="http://schemas.microsoft.com/office/drawing/2014/main" id="{29E9B929-2E6C-4B35-810E-19720D04A573}"/>
+              </a:ext>
+            </a:extLst>
+          </p:cNvPr>
+          <p:cNvPicPr>
+            <a:picLocks noGrp="1" noChangeAspect="1"/>
+          </p:cNvPicPr>
           <p:nvPr>
             <p:ph idx="1"/>
           </p:nvPr>
-        </p:nvSpPr>
-        <p:spPr/>
-        <p:txBody>
-          <a:bodyPr/>
-          <a:lstStyle/>
-          <a:p>
-            <a:r>
-              <a:rPr lang="de-DE" dirty="0"/>
-              <a:t>Ausgereifte Lösung</a:t>
-            </a:r>
-          </a:p>
-          <a:p>
-            <a:r>
-              <a:rPr lang="de-DE" dirty="0"/>
-              <a:t>Methoden-Leitfaden</a:t>
-            </a:r>
-          </a:p>
-        </p:txBody>
-      </p:sp>
-      <p:sp>
-        <p:nvSpPr>
-          <p:cNvPr id="4" name="Foliennummernplatzhalter 3">
-            <a:extLst>
-              <a:ext uri="{FF2B5EF4-FFF2-40B4-BE49-F238E27FC236}">
-                <a16:creationId xmlns:a16="http://schemas.microsoft.com/office/drawing/2014/main" id="{64E4DB4D-C5D3-4C45-973C-8F7D3D86C06E}"/>
+        </p:nvPicPr>
+        <p:blipFill>
+          <a:blip r:embed="rId2">
+            <a:extLst>
+              <a:ext uri="{28A0092B-C50C-407E-A947-70E740481C1C}">
+                <a14:useLocalDpi xmlns:a14="http://schemas.microsoft.com/office/drawing/2010/main" val="0"/>
+              </a:ext>
+            </a:extLst>
+          </a:blip>
+          <a:stretch>
+            <a:fillRect/>
+          </a:stretch>
+        </p:blipFill>
+        <p:spPr>
+          <a:xfrm>
+            <a:off x="2332841" y="2963747"/>
+            <a:ext cx="7102455" cy="2667231"/>
+          </a:xfrm>
+        </p:spPr>
+      </p:pic>
+      <p:sp>
+        <p:nvSpPr>
+          <p:cNvPr id="4" name="Fußzeilenplatzhalter 3">
+            <a:extLst>
+              <a:ext uri="{FF2B5EF4-FFF2-40B4-BE49-F238E27FC236}">
+                <a16:creationId xmlns:a16="http://schemas.microsoft.com/office/drawing/2014/main" id="{E92880CC-E9D1-4816-AEB3-4CF6E13F0D90}"/>
+              </a:ext>
+            </a:extLst>
+          </p:cNvPr>
+          <p:cNvSpPr>
+            <a:spLocks noGrp="1"/>
+          </p:cNvSpPr>
+          <p:nvPr>
+            <p:ph type="ftr" sz="quarter" idx="11"/>
+          </p:nvPr>
+        </p:nvSpPr>
+        <p:spPr/>
+        <p:txBody>
+          <a:bodyPr/>
+          <a:lstStyle/>
+          <a:p>
+            <a:r>
+              <a:rPr lang="de-DE"/>
+              <a:t>Fynn Klöpper - NodeJS &amp; API-Technologien</a:t>
+            </a:r>
+          </a:p>
+        </p:txBody>
+      </p:sp>
+      <p:sp>
+        <p:nvSpPr>
+          <p:cNvPr id="5" name="Foliennummernplatzhalter 4">
+            <a:extLst>
+              <a:ext uri="{FF2B5EF4-FFF2-40B4-BE49-F238E27FC236}">
+                <a16:creationId xmlns:a16="http://schemas.microsoft.com/office/drawing/2014/main" id="{831DE9F4-E530-45C6-B453-3D505A459700}"/>
               </a:ext>
             </a:extLst>
           </p:cNvPr>
@@ -5498,36 +5701,66 @@
       </p:sp>
       <p:sp>
         <p:nvSpPr>
-          <p:cNvPr id="5" name="Fußzeilenplatzhalter 4">
-            <a:extLst>
-              <a:ext uri="{FF2B5EF4-FFF2-40B4-BE49-F238E27FC236}">
-                <a16:creationId xmlns:a16="http://schemas.microsoft.com/office/drawing/2014/main" id="{A4500EF7-95F6-4624-B945-711375B4339E}"/>
-              </a:ext>
-            </a:extLst>
-          </p:cNvPr>
-          <p:cNvSpPr>
-            <a:spLocks noGrp="1"/>
-          </p:cNvSpPr>
-          <p:nvPr>
-            <p:ph type="ftr" sz="quarter" idx="11"/>
-          </p:nvPr>
-        </p:nvSpPr>
-        <p:spPr/>
-        <p:txBody>
-          <a:bodyPr/>
-          <a:lstStyle/>
-          <a:p>
-            <a:r>
-              <a:rPr lang="de-DE"/>
-              <a:t>Fynn Klöpper - NodeJS &amp; API-Technologien</a:t>
-            </a:r>
+          <p:cNvPr id="8" name="Textfeld 7">
+            <a:extLst>
+              <a:ext uri="{FF2B5EF4-FFF2-40B4-BE49-F238E27FC236}">
+                <a16:creationId xmlns:a16="http://schemas.microsoft.com/office/drawing/2014/main" id="{FAE784CE-0EAC-446A-924B-6A36BD634F37}"/>
+              </a:ext>
+            </a:extLst>
+          </p:cNvPr>
+          <p:cNvSpPr txBox="1"/>
+          <p:nvPr/>
+        </p:nvSpPr>
+        <p:spPr>
+          <a:xfrm>
+            <a:off x="4586171" y="5543010"/>
+            <a:ext cx="2547492" cy="215444"/>
+          </a:xfrm>
+          <a:prstGeom prst="rect">
+            <a:avLst/>
+          </a:prstGeom>
+          <a:noFill/>
+        </p:spPr>
+        <p:txBody>
+          <a:bodyPr wrap="none" rtlCol="0">
+            <a:spAutoFit/>
+          </a:bodyPr>
+          <a:lstStyle/>
+          <a:p>
+            <a:r>
+              <a:rPr lang="en-US" sz="800" dirty="0" err="1">
+                <a:solidFill>
+                  <a:schemeClr val="bg1">
+                    <a:lumMod val="65000"/>
+                  </a:schemeClr>
+                </a:solidFill>
+              </a:rPr>
+              <a:t>Doglio</a:t>
+            </a:r>
+            <a:r>
+              <a:rPr lang="en-US" sz="800" dirty="0">
+                <a:solidFill>
+                  <a:schemeClr val="bg1">
+                    <a:lumMod val="65000"/>
+                  </a:schemeClr>
+                </a:solidFill>
+              </a:rPr>
+              <a:t>, Fernando: Pro REST API Development with Node.js</a:t>
+            </a:r>
+            <a:endParaRPr lang="de-DE" sz="800" dirty="0">
+              <a:solidFill>
+                <a:schemeClr val="bg1">
+                  <a:lumMod val="65000"/>
+                </a:schemeClr>
+              </a:solidFill>
+            </a:endParaRPr>
           </a:p>
         </p:txBody>
       </p:sp>
     </p:spTree>
     <p:extLst>
       <p:ext uri="{BB962C8B-B14F-4D97-AF65-F5344CB8AC3E}">
-        <p14:creationId xmlns:p14="http://schemas.microsoft.com/office/powerpoint/2010/main" val="702001325"/>
+        <p14:creationId xmlns:p14="http://schemas.microsoft.com/office/powerpoint/2010/main" val="1527581107"/>
       </p:ext>
     </p:extLst>
   </p:cSld>
@@ -5604,51 +5837,59 @@
           <a:lstStyle/>
           <a:p>
             <a:r>
+              <a:rPr lang="de-DE" dirty="0" err="1"/>
+              <a:t>NodeJS</a:t>
+            </a:r>
+            <a:endParaRPr lang="de-DE" dirty="0"/>
+          </a:p>
+          <a:p>
+            <a:r>
+              <a:rPr lang="de-DE" dirty="0"/>
+              <a:t>API-Technologien</a:t>
+            </a:r>
+          </a:p>
+          <a:p>
+            <a:pPr lvl="1"/>
+            <a:r>
+              <a:rPr lang="de-DE" dirty="0"/>
+              <a:t>gRPC</a:t>
+            </a:r>
+          </a:p>
+          <a:p>
+            <a:pPr lvl="1"/>
+            <a:r>
+              <a:rPr lang="de-DE" dirty="0"/>
+              <a:t>REST</a:t>
+            </a:r>
+          </a:p>
+          <a:p>
+            <a:pPr lvl="1"/>
+            <a:r>
+              <a:rPr lang="de-DE" dirty="0" err="1"/>
+              <a:t>GraphQL</a:t>
+            </a:r>
+            <a:endParaRPr lang="de-DE" dirty="0"/>
+          </a:p>
+          <a:p>
+            <a:pPr lvl="1"/>
+            <a:r>
+              <a:rPr lang="de-DE" dirty="0"/>
+              <a:t>Vergleich</a:t>
+            </a:r>
+          </a:p>
+          <a:p>
+            <a:r>
               <a:rPr lang="de-DE" dirty="0"/>
               <a:t>Softwaredemo</a:t>
             </a:r>
           </a:p>
           <a:p>
-            <a:r>
-              <a:rPr lang="de-DE" dirty="0" err="1"/>
-              <a:t>NodeJS</a:t>
-            </a:r>
+            <a:pPr lvl="1"/>
             <a:endParaRPr lang="de-DE" dirty="0"/>
           </a:p>
           <a:p>
-            <a:r>
-              <a:rPr lang="de-DE" dirty="0"/>
-              <a:t>API-Technologien</a:t>
-            </a:r>
-          </a:p>
-          <a:p>
             <a:pPr lvl="1"/>
-            <a:r>
-              <a:rPr lang="de-DE" dirty="0"/>
-              <a:t>gRPC</a:t>
-            </a:r>
-          </a:p>
-          <a:p>
-            <a:pPr lvl="1"/>
-            <a:r>
-              <a:rPr lang="de-DE" dirty="0"/>
-              <a:t>REST</a:t>
-            </a:r>
-          </a:p>
-          <a:p>
-            <a:pPr lvl="1"/>
-            <a:r>
-              <a:rPr lang="de-DE" dirty="0" err="1"/>
-              <a:t>GraphQL</a:t>
-            </a:r>
             <a:endParaRPr lang="de-DE" dirty="0"/>
-          </a:p>
-          <a:p>
-            <a:pPr lvl="1"/>
-            <a:r>
-              <a:rPr lang="de-DE" dirty="0"/>
-              <a:t>Vergleich</a:t>
-            </a:r>
           </a:p>
         </p:txBody>
       </p:sp>
@@ -5744,7 +5985,7 @@
           <p:cNvPr id="2" name="Titel 1">
             <a:extLst>
               <a:ext uri="{FF2B5EF4-FFF2-40B4-BE49-F238E27FC236}">
-                <a16:creationId xmlns:a16="http://schemas.microsoft.com/office/drawing/2014/main" id="{53923327-9D48-4395-8352-33E813C3DD22}"/>
+                <a16:creationId xmlns:a16="http://schemas.microsoft.com/office/drawing/2014/main" id="{BF9DCF6D-A5B1-43CA-AC17-332085A4DF92}"/>
               </a:ext>
             </a:extLst>
           </p:cNvPr>
@@ -5762,51 +6003,88 @@
           <a:p>
             <a:r>
               <a:rPr lang="de-DE" dirty="0"/>
-              <a:t>REST – Nachteile	</a:t>
-            </a:r>
-          </a:p>
-        </p:txBody>
-      </p:sp>
-      <p:sp>
-        <p:nvSpPr>
-          <p:cNvPr id="3" name="Inhaltsplatzhalter 2">
-            <a:extLst>
-              <a:ext uri="{FF2B5EF4-FFF2-40B4-BE49-F238E27FC236}">
-                <a16:creationId xmlns:a16="http://schemas.microsoft.com/office/drawing/2014/main" id="{E485ACFA-5E0B-429B-B08A-BB98F34E56F4}"/>
-              </a:ext>
-            </a:extLst>
-          </p:cNvPr>
-          <p:cNvSpPr>
-            <a:spLocks noGrp="1"/>
-          </p:cNvSpPr>
+              <a:t>REST – </a:t>
+            </a:r>
+            <a:r>
+              <a:rPr lang="de-DE" dirty="0" err="1"/>
+              <a:t>Stateless</a:t>
+            </a:r>
+            <a:r>
+              <a:rPr lang="de-DE" dirty="0"/>
+              <a:t> 2/6</a:t>
+            </a:r>
+          </a:p>
+        </p:txBody>
+      </p:sp>
+      <p:pic>
+        <p:nvPicPr>
+          <p:cNvPr id="7" name="Inhaltsplatzhalter 6">
+            <a:extLst>
+              <a:ext uri="{FF2B5EF4-FFF2-40B4-BE49-F238E27FC236}">
+                <a16:creationId xmlns:a16="http://schemas.microsoft.com/office/drawing/2014/main" id="{35E05168-91A5-4A20-AEA6-5A5CF2E77BDA}"/>
+              </a:ext>
+            </a:extLst>
+          </p:cNvPr>
+          <p:cNvPicPr>
+            <a:picLocks noGrp="1" noChangeAspect="1"/>
+          </p:cNvPicPr>
           <p:nvPr>
             <p:ph idx="1"/>
           </p:nvPr>
-        </p:nvSpPr>
-        <p:spPr/>
-        <p:txBody>
-          <a:bodyPr/>
-          <a:lstStyle/>
-          <a:p>
-            <a:r>
-              <a:rPr lang="de-DE" dirty="0"/>
-              <a:t>Fehlerhafte REST-Implementierungen</a:t>
-            </a:r>
-          </a:p>
-          <a:p>
-            <a:r>
-              <a:rPr lang="de-DE" dirty="0"/>
-              <a:t>Overhead durch die Prinzipien</a:t>
-            </a:r>
-          </a:p>
-        </p:txBody>
-      </p:sp>
-      <p:sp>
-        <p:nvSpPr>
-          <p:cNvPr id="4" name="Foliennummernplatzhalter 3">
-            <a:extLst>
-              <a:ext uri="{FF2B5EF4-FFF2-40B4-BE49-F238E27FC236}">
-                <a16:creationId xmlns:a16="http://schemas.microsoft.com/office/drawing/2014/main" id="{CD72727C-9F6D-4C5A-BD08-608D59DFFCAC}"/>
+        </p:nvPicPr>
+        <p:blipFill>
+          <a:blip r:embed="rId2">
+            <a:extLst>
+              <a:ext uri="{28A0092B-C50C-407E-A947-70E740481C1C}">
+                <a14:useLocalDpi xmlns:a14="http://schemas.microsoft.com/office/drawing/2010/main" val="0"/>
+              </a:ext>
+            </a:extLst>
+          </a:blip>
+          <a:stretch>
+            <a:fillRect/>
+          </a:stretch>
+        </p:blipFill>
+        <p:spPr>
+          <a:xfrm>
+            <a:off x="2810167" y="2286000"/>
+            <a:ext cx="6147803" cy="4022725"/>
+          </a:xfrm>
+        </p:spPr>
+      </p:pic>
+      <p:sp>
+        <p:nvSpPr>
+          <p:cNvPr id="4" name="Fußzeilenplatzhalter 3">
+            <a:extLst>
+              <a:ext uri="{FF2B5EF4-FFF2-40B4-BE49-F238E27FC236}">
+                <a16:creationId xmlns:a16="http://schemas.microsoft.com/office/drawing/2014/main" id="{1110674F-77E2-4F82-8BAD-80BC913F15DB}"/>
+              </a:ext>
+            </a:extLst>
+          </p:cNvPr>
+          <p:cNvSpPr>
+            <a:spLocks noGrp="1"/>
+          </p:cNvSpPr>
+          <p:nvPr>
+            <p:ph type="ftr" sz="quarter" idx="11"/>
+          </p:nvPr>
+        </p:nvSpPr>
+        <p:spPr/>
+        <p:txBody>
+          <a:bodyPr/>
+          <a:lstStyle/>
+          <a:p>
+            <a:r>
+              <a:rPr lang="de-DE"/>
+              <a:t>Fynn Klöpper - NodeJS &amp; API-Technologien</a:t>
+            </a:r>
+          </a:p>
+        </p:txBody>
+      </p:sp>
+      <p:sp>
+        <p:nvSpPr>
+          <p:cNvPr id="5" name="Foliennummernplatzhalter 4">
+            <a:extLst>
+              <a:ext uri="{FF2B5EF4-FFF2-40B4-BE49-F238E27FC236}">
+                <a16:creationId xmlns:a16="http://schemas.microsoft.com/office/drawing/2014/main" id="{4A5DED18-0D12-4AB4-A764-9663FC3787CD}"/>
               </a:ext>
             </a:extLst>
           </p:cNvPr>
@@ -5832,36 +6110,66 @@
       </p:sp>
       <p:sp>
         <p:nvSpPr>
-          <p:cNvPr id="5" name="Fußzeilenplatzhalter 4">
-            <a:extLst>
-              <a:ext uri="{FF2B5EF4-FFF2-40B4-BE49-F238E27FC236}">
-                <a16:creationId xmlns:a16="http://schemas.microsoft.com/office/drawing/2014/main" id="{61A01072-D868-4B95-B974-6FC176015352}"/>
-              </a:ext>
-            </a:extLst>
-          </p:cNvPr>
-          <p:cNvSpPr>
-            <a:spLocks noGrp="1"/>
-          </p:cNvSpPr>
-          <p:nvPr>
-            <p:ph type="ftr" sz="quarter" idx="11"/>
-          </p:nvPr>
-        </p:nvSpPr>
-        <p:spPr/>
-        <p:txBody>
-          <a:bodyPr/>
-          <a:lstStyle/>
-          <a:p>
-            <a:r>
-              <a:rPr lang="de-DE"/>
-              <a:t>Fynn Klöpper - NodeJS &amp; API-Technologien</a:t>
-            </a:r>
+          <p:cNvPr id="8" name="Textfeld 7">
+            <a:extLst>
+              <a:ext uri="{FF2B5EF4-FFF2-40B4-BE49-F238E27FC236}">
+                <a16:creationId xmlns:a16="http://schemas.microsoft.com/office/drawing/2014/main" id="{3957ED83-0909-4701-BB40-89A35FDA44C7}"/>
+              </a:ext>
+            </a:extLst>
+          </p:cNvPr>
+          <p:cNvSpPr txBox="1"/>
+          <p:nvPr/>
+        </p:nvSpPr>
+        <p:spPr>
+          <a:xfrm>
+            <a:off x="4252063" y="6174271"/>
+            <a:ext cx="2547492" cy="215444"/>
+          </a:xfrm>
+          <a:prstGeom prst="rect">
+            <a:avLst/>
+          </a:prstGeom>
+          <a:noFill/>
+        </p:spPr>
+        <p:txBody>
+          <a:bodyPr wrap="none" rtlCol="0">
+            <a:spAutoFit/>
+          </a:bodyPr>
+          <a:lstStyle/>
+          <a:p>
+            <a:r>
+              <a:rPr lang="en-US" sz="800" dirty="0" err="1">
+                <a:solidFill>
+                  <a:schemeClr val="bg1">
+                    <a:lumMod val="65000"/>
+                  </a:schemeClr>
+                </a:solidFill>
+              </a:rPr>
+              <a:t>Doglio</a:t>
+            </a:r>
+            <a:r>
+              <a:rPr lang="en-US" sz="800" dirty="0">
+                <a:solidFill>
+                  <a:schemeClr val="bg1">
+                    <a:lumMod val="65000"/>
+                  </a:schemeClr>
+                </a:solidFill>
+              </a:rPr>
+              <a:t>, Fernando: Pro REST API Development with Node.js</a:t>
+            </a:r>
+            <a:endParaRPr lang="de-DE" sz="800" dirty="0">
+              <a:solidFill>
+                <a:schemeClr val="bg1">
+                  <a:lumMod val="65000"/>
+                </a:schemeClr>
+              </a:solidFill>
+            </a:endParaRPr>
           </a:p>
         </p:txBody>
       </p:sp>
     </p:spTree>
     <p:extLst>
       <p:ext uri="{BB962C8B-B14F-4D97-AF65-F5344CB8AC3E}">
-        <p14:creationId xmlns:p14="http://schemas.microsoft.com/office/powerpoint/2010/main" val="1476592971"/>
+        <p14:creationId xmlns:p14="http://schemas.microsoft.com/office/powerpoint/2010/main" val="2455968264"/>
       </p:ext>
     </p:extLst>
   </p:cSld>
@@ -5893,7 +6201,7 @@
           <p:cNvPr id="2" name="Titel 1">
             <a:extLst>
               <a:ext uri="{FF2B5EF4-FFF2-40B4-BE49-F238E27FC236}">
-                <a16:creationId xmlns:a16="http://schemas.microsoft.com/office/drawing/2014/main" id="{AF1377FA-2435-4C65-A437-5DDAED4B5BAD}"/>
+                <a16:creationId xmlns:a16="http://schemas.microsoft.com/office/drawing/2014/main" id="{BCE4DF02-D531-439F-A8B1-DD9245AEB036}"/>
               </a:ext>
             </a:extLst>
           </p:cNvPr>
@@ -5910,69 +6218,81 @@
           <a:lstStyle/>
           <a:p>
             <a:r>
-              <a:rPr lang="de-DE" dirty="0" err="1"/>
-              <a:t>GraphQL</a:t>
-            </a:r>
-            <a:r>
               <a:rPr lang="de-DE" dirty="0"/>
-              <a:t> – Allgemein	</a:t>
-            </a:r>
-          </a:p>
-        </p:txBody>
-      </p:sp>
-      <p:sp>
-        <p:nvSpPr>
-          <p:cNvPr id="3" name="Inhaltsplatzhalter 2">
-            <a:extLst>
-              <a:ext uri="{FF2B5EF4-FFF2-40B4-BE49-F238E27FC236}">
-                <a16:creationId xmlns:a16="http://schemas.microsoft.com/office/drawing/2014/main" id="{BBFFA9A4-04DF-41DD-A59E-8FAF4D695C4D}"/>
-              </a:ext>
-            </a:extLst>
-          </p:cNvPr>
-          <p:cNvSpPr>
-            <a:spLocks noGrp="1"/>
-          </p:cNvSpPr>
+              <a:t>REST – Cache 3/6</a:t>
+            </a:r>
+          </a:p>
+        </p:txBody>
+      </p:sp>
+      <p:pic>
+        <p:nvPicPr>
+          <p:cNvPr id="7" name="Inhaltsplatzhalter 6">
+            <a:extLst>
+              <a:ext uri="{FF2B5EF4-FFF2-40B4-BE49-F238E27FC236}">
+                <a16:creationId xmlns:a16="http://schemas.microsoft.com/office/drawing/2014/main" id="{63F1EA05-E46B-4624-A126-A3F4ECC9D956}"/>
+              </a:ext>
+            </a:extLst>
+          </p:cNvPr>
+          <p:cNvPicPr>
+            <a:picLocks noGrp="1" noChangeAspect="1"/>
+          </p:cNvPicPr>
           <p:nvPr>
             <p:ph idx="1"/>
           </p:nvPr>
-        </p:nvSpPr>
-        <p:spPr/>
-        <p:txBody>
-          <a:bodyPr/>
-          <a:lstStyle/>
-          <a:p>
-            <a:r>
-              <a:rPr lang="de-DE" dirty="0"/>
-              <a:t>Von Facebook entwickelt</a:t>
-            </a:r>
-          </a:p>
-          <a:p>
-            <a:r>
-              <a:rPr lang="de-DE" dirty="0"/>
-              <a:t>Query-Anfragen</a:t>
-            </a:r>
-          </a:p>
-          <a:p>
-            <a:r>
-              <a:rPr lang="de-DE" dirty="0"/>
-              <a:t>Viele Client-Arten</a:t>
-            </a:r>
-          </a:p>
-          <a:p>
-            <a:r>
-              <a:rPr lang="de-DE" dirty="0" err="1"/>
-              <a:t>GraphiQL</a:t>
-            </a:r>
-            <a:endParaRPr lang="de-DE" dirty="0"/>
-          </a:p>
-        </p:txBody>
-      </p:sp>
-      <p:sp>
-        <p:nvSpPr>
-          <p:cNvPr id="4" name="Foliennummernplatzhalter 3">
-            <a:extLst>
-              <a:ext uri="{FF2B5EF4-FFF2-40B4-BE49-F238E27FC236}">
-                <a16:creationId xmlns:a16="http://schemas.microsoft.com/office/drawing/2014/main" id="{C23B86B9-9FC0-4BFA-A85D-944AC024B436}"/>
+        </p:nvPicPr>
+        <p:blipFill>
+          <a:blip r:embed="rId2">
+            <a:extLst>
+              <a:ext uri="{28A0092B-C50C-407E-A947-70E740481C1C}">
+                <a14:useLocalDpi xmlns:a14="http://schemas.microsoft.com/office/drawing/2010/main" val="0"/>
+              </a:ext>
+            </a:extLst>
+          </a:blip>
+          <a:stretch>
+            <a:fillRect/>
+          </a:stretch>
+        </p:blipFill>
+        <p:spPr>
+          <a:xfrm>
+            <a:off x="2687373" y="2286000"/>
+            <a:ext cx="6393391" cy="4022725"/>
+          </a:xfrm>
+        </p:spPr>
+      </p:pic>
+      <p:sp>
+        <p:nvSpPr>
+          <p:cNvPr id="4" name="Fußzeilenplatzhalter 3">
+            <a:extLst>
+              <a:ext uri="{FF2B5EF4-FFF2-40B4-BE49-F238E27FC236}">
+                <a16:creationId xmlns:a16="http://schemas.microsoft.com/office/drawing/2014/main" id="{73469834-0328-48CE-847A-E0E3928D7586}"/>
+              </a:ext>
+            </a:extLst>
+          </p:cNvPr>
+          <p:cNvSpPr>
+            <a:spLocks noGrp="1"/>
+          </p:cNvSpPr>
+          <p:nvPr>
+            <p:ph type="ftr" sz="quarter" idx="11"/>
+          </p:nvPr>
+        </p:nvSpPr>
+        <p:spPr/>
+        <p:txBody>
+          <a:bodyPr/>
+          <a:lstStyle/>
+          <a:p>
+            <a:r>
+              <a:rPr lang="de-DE"/>
+              <a:t>Fynn Klöpper - NodeJS &amp; API-Technologien</a:t>
+            </a:r>
+          </a:p>
+        </p:txBody>
+      </p:sp>
+      <p:sp>
+        <p:nvSpPr>
+          <p:cNvPr id="5" name="Foliennummernplatzhalter 4">
+            <a:extLst>
+              <a:ext uri="{FF2B5EF4-FFF2-40B4-BE49-F238E27FC236}">
+                <a16:creationId xmlns:a16="http://schemas.microsoft.com/office/drawing/2014/main" id="{8D188EB3-1781-4A0E-991D-F927BD7DFDC4}"/>
               </a:ext>
             </a:extLst>
           </p:cNvPr>
@@ -5998,36 +6318,66 @@
       </p:sp>
       <p:sp>
         <p:nvSpPr>
-          <p:cNvPr id="5" name="Fußzeilenplatzhalter 4">
-            <a:extLst>
-              <a:ext uri="{FF2B5EF4-FFF2-40B4-BE49-F238E27FC236}">
-                <a16:creationId xmlns:a16="http://schemas.microsoft.com/office/drawing/2014/main" id="{F419DE5C-9E75-41CC-9A5C-4845AA2C2E60}"/>
-              </a:ext>
-            </a:extLst>
-          </p:cNvPr>
-          <p:cNvSpPr>
-            <a:spLocks noGrp="1"/>
-          </p:cNvSpPr>
-          <p:nvPr>
-            <p:ph type="ftr" sz="quarter" idx="11"/>
-          </p:nvPr>
-        </p:nvSpPr>
-        <p:spPr/>
-        <p:txBody>
-          <a:bodyPr/>
-          <a:lstStyle/>
-          <a:p>
-            <a:r>
-              <a:rPr lang="de-DE"/>
-              <a:t>Fynn Klöpper - NodeJS &amp; API-Technologien</a:t>
-            </a:r>
+          <p:cNvPr id="8" name="Textfeld 7">
+            <a:extLst>
+              <a:ext uri="{FF2B5EF4-FFF2-40B4-BE49-F238E27FC236}">
+                <a16:creationId xmlns:a16="http://schemas.microsoft.com/office/drawing/2014/main" id="{F799D84D-825B-4085-B12A-F2848FEBECC9}"/>
+              </a:ext>
+            </a:extLst>
+          </p:cNvPr>
+          <p:cNvSpPr txBox="1"/>
+          <p:nvPr/>
+        </p:nvSpPr>
+        <p:spPr>
+          <a:xfrm>
+            <a:off x="3750902" y="6294449"/>
+            <a:ext cx="2547492" cy="215444"/>
+          </a:xfrm>
+          <a:prstGeom prst="rect">
+            <a:avLst/>
+          </a:prstGeom>
+          <a:noFill/>
+        </p:spPr>
+        <p:txBody>
+          <a:bodyPr wrap="none" rtlCol="0">
+            <a:spAutoFit/>
+          </a:bodyPr>
+          <a:lstStyle/>
+          <a:p>
+            <a:r>
+              <a:rPr lang="en-US" sz="800" dirty="0" err="1">
+                <a:solidFill>
+                  <a:schemeClr val="bg1">
+                    <a:lumMod val="65000"/>
+                  </a:schemeClr>
+                </a:solidFill>
+              </a:rPr>
+              <a:t>Doglio</a:t>
+            </a:r>
+            <a:r>
+              <a:rPr lang="en-US" sz="800" dirty="0">
+                <a:solidFill>
+                  <a:schemeClr val="bg1">
+                    <a:lumMod val="65000"/>
+                  </a:schemeClr>
+                </a:solidFill>
+              </a:rPr>
+              <a:t>, Fernando: Pro REST API Development with Node.js</a:t>
+            </a:r>
+            <a:endParaRPr lang="de-DE" sz="800" dirty="0">
+              <a:solidFill>
+                <a:schemeClr val="bg1">
+                  <a:lumMod val="65000"/>
+                </a:schemeClr>
+              </a:solidFill>
+            </a:endParaRPr>
           </a:p>
         </p:txBody>
       </p:sp>
     </p:spTree>
     <p:extLst>
       <p:ext uri="{BB962C8B-B14F-4D97-AF65-F5344CB8AC3E}">
-        <p14:creationId xmlns:p14="http://schemas.microsoft.com/office/powerpoint/2010/main" val="4126727332"/>
+        <p14:creationId xmlns:p14="http://schemas.microsoft.com/office/powerpoint/2010/main" val="2250734541"/>
       </p:ext>
     </p:extLst>
   </p:cSld>
@@ -6059,7 +6409,7 @@
           <p:cNvPr id="2" name="Titel 1">
             <a:extLst>
               <a:ext uri="{FF2B5EF4-FFF2-40B4-BE49-F238E27FC236}">
-                <a16:creationId xmlns:a16="http://schemas.microsoft.com/office/drawing/2014/main" id="{53A4D78B-C815-4691-8C72-CDFD54B46C19}"/>
+                <a16:creationId xmlns:a16="http://schemas.microsoft.com/office/drawing/2014/main" id="{B1DE7259-C6C2-47D4-BEE4-68668D961B0F}"/>
               </a:ext>
             </a:extLst>
           </p:cNvPr>
@@ -6076,64 +6426,81 @@
           <a:lstStyle/>
           <a:p>
             <a:r>
-              <a:rPr lang="de-DE" dirty="0" err="1"/>
-              <a:t>GraphQL</a:t>
-            </a:r>
-            <a:r>
               <a:rPr lang="de-DE" dirty="0"/>
-              <a:t> – Vorteile	</a:t>
-            </a:r>
-          </a:p>
-        </p:txBody>
-      </p:sp>
-      <p:sp>
-        <p:nvSpPr>
-          <p:cNvPr id="3" name="Inhaltsplatzhalter 2">
-            <a:extLst>
-              <a:ext uri="{FF2B5EF4-FFF2-40B4-BE49-F238E27FC236}">
-                <a16:creationId xmlns:a16="http://schemas.microsoft.com/office/drawing/2014/main" id="{710910FD-8204-40B0-BE1A-28CC8547909F}"/>
-              </a:ext>
-            </a:extLst>
-          </p:cNvPr>
-          <p:cNvSpPr>
-            <a:spLocks noGrp="1"/>
-          </p:cNvSpPr>
+              <a:t>REST – Uniform-interface 4/6</a:t>
+            </a:r>
+          </a:p>
+        </p:txBody>
+      </p:sp>
+      <p:pic>
+        <p:nvPicPr>
+          <p:cNvPr id="7" name="Inhaltsplatzhalter 6">
+            <a:extLst>
+              <a:ext uri="{FF2B5EF4-FFF2-40B4-BE49-F238E27FC236}">
+                <a16:creationId xmlns:a16="http://schemas.microsoft.com/office/drawing/2014/main" id="{05738C6C-3C68-4D5E-BAAE-2946BF12F2B1}"/>
+              </a:ext>
+            </a:extLst>
+          </p:cNvPr>
+          <p:cNvPicPr>
+            <a:picLocks noGrp="1" noChangeAspect="1"/>
+          </p:cNvPicPr>
           <p:nvPr>
             <p:ph idx="1"/>
           </p:nvPr>
-        </p:nvSpPr>
-        <p:spPr/>
-        <p:txBody>
-          <a:bodyPr/>
-          <a:lstStyle/>
-          <a:p>
-            <a:r>
-              <a:rPr lang="de-DE" dirty="0"/>
-              <a:t>Optimale Datenrückgabe durch </a:t>
-            </a:r>
-            <a:r>
-              <a:rPr lang="de-DE" dirty="0" err="1"/>
-              <a:t>Queries</a:t>
-            </a:r>
-            <a:endParaRPr lang="de-DE" dirty="0"/>
-          </a:p>
-          <a:p>
-            <a:r>
-              <a:rPr lang="de-DE" dirty="0"/>
-              <a:t>Viele Client-Arten auf einmal bedient</a:t>
-            </a:r>
-          </a:p>
-          <a:p>
-            <a:endParaRPr lang="de-DE" dirty="0"/>
-          </a:p>
-        </p:txBody>
-      </p:sp>
-      <p:sp>
-        <p:nvSpPr>
-          <p:cNvPr id="4" name="Foliennummernplatzhalter 3">
-            <a:extLst>
-              <a:ext uri="{FF2B5EF4-FFF2-40B4-BE49-F238E27FC236}">
-                <a16:creationId xmlns:a16="http://schemas.microsoft.com/office/drawing/2014/main" id="{9EC3F893-3DE8-4575-839D-1917A4A2D563}"/>
+        </p:nvPicPr>
+        <p:blipFill>
+          <a:blip r:embed="rId2">
+            <a:extLst>
+              <a:ext uri="{28A0092B-C50C-407E-A947-70E740481C1C}">
+                <a14:useLocalDpi xmlns:a14="http://schemas.microsoft.com/office/drawing/2010/main" val="0"/>
+              </a:ext>
+            </a:extLst>
+          </a:blip>
+          <a:stretch>
+            <a:fillRect/>
+          </a:stretch>
+        </p:blipFill>
+        <p:spPr>
+          <a:xfrm>
+            <a:off x="2861741" y="2286000"/>
+            <a:ext cx="6044655" cy="4022725"/>
+          </a:xfrm>
+        </p:spPr>
+      </p:pic>
+      <p:sp>
+        <p:nvSpPr>
+          <p:cNvPr id="4" name="Fußzeilenplatzhalter 3">
+            <a:extLst>
+              <a:ext uri="{FF2B5EF4-FFF2-40B4-BE49-F238E27FC236}">
+                <a16:creationId xmlns:a16="http://schemas.microsoft.com/office/drawing/2014/main" id="{8EAA7128-3628-4CA2-B439-C0C69ED74384}"/>
+              </a:ext>
+            </a:extLst>
+          </p:cNvPr>
+          <p:cNvSpPr>
+            <a:spLocks noGrp="1"/>
+          </p:cNvSpPr>
+          <p:nvPr>
+            <p:ph type="ftr" sz="quarter" idx="11"/>
+          </p:nvPr>
+        </p:nvSpPr>
+        <p:spPr/>
+        <p:txBody>
+          <a:bodyPr/>
+          <a:lstStyle/>
+          <a:p>
+            <a:r>
+              <a:rPr lang="de-DE"/>
+              <a:t>Fynn Klöpper - NodeJS &amp; API-Technologien</a:t>
+            </a:r>
+          </a:p>
+        </p:txBody>
+      </p:sp>
+      <p:sp>
+        <p:nvSpPr>
+          <p:cNvPr id="5" name="Foliennummernplatzhalter 4">
+            <a:extLst>
+              <a:ext uri="{FF2B5EF4-FFF2-40B4-BE49-F238E27FC236}">
+                <a16:creationId xmlns:a16="http://schemas.microsoft.com/office/drawing/2014/main" id="{CC37CB1C-77CF-41FD-9C87-3A8A735710D9}"/>
               </a:ext>
             </a:extLst>
           </p:cNvPr>
@@ -6159,36 +6526,66 @@
       </p:sp>
       <p:sp>
         <p:nvSpPr>
-          <p:cNvPr id="5" name="Fußzeilenplatzhalter 4">
-            <a:extLst>
-              <a:ext uri="{FF2B5EF4-FFF2-40B4-BE49-F238E27FC236}">
-                <a16:creationId xmlns:a16="http://schemas.microsoft.com/office/drawing/2014/main" id="{666F5365-8717-4A4D-9D32-8CD14E43E700}"/>
-              </a:ext>
-            </a:extLst>
-          </p:cNvPr>
-          <p:cNvSpPr>
-            <a:spLocks noGrp="1"/>
-          </p:cNvSpPr>
-          <p:nvPr>
-            <p:ph type="ftr" sz="quarter" idx="11"/>
-          </p:nvPr>
-        </p:nvSpPr>
-        <p:spPr/>
-        <p:txBody>
-          <a:bodyPr/>
-          <a:lstStyle/>
-          <a:p>
-            <a:r>
-              <a:rPr lang="de-DE"/>
-              <a:t>Fynn Klöpper - NodeJS &amp; API-Technologien</a:t>
-            </a:r>
+          <p:cNvPr id="8" name="Textfeld 7">
+            <a:extLst>
+              <a:ext uri="{FF2B5EF4-FFF2-40B4-BE49-F238E27FC236}">
+                <a16:creationId xmlns:a16="http://schemas.microsoft.com/office/drawing/2014/main" id="{D7E3D2CF-C80E-4943-B226-344E67D7A84E}"/>
+              </a:ext>
+            </a:extLst>
+          </p:cNvPr>
+          <p:cNvSpPr txBox="1"/>
+          <p:nvPr/>
+        </p:nvSpPr>
+        <p:spPr>
+          <a:xfrm>
+            <a:off x="3548508" y="6362982"/>
+            <a:ext cx="2547492" cy="215444"/>
+          </a:xfrm>
+          <a:prstGeom prst="rect">
+            <a:avLst/>
+          </a:prstGeom>
+          <a:noFill/>
+        </p:spPr>
+        <p:txBody>
+          <a:bodyPr wrap="none" rtlCol="0">
+            <a:spAutoFit/>
+          </a:bodyPr>
+          <a:lstStyle/>
+          <a:p>
+            <a:r>
+              <a:rPr lang="en-US" sz="800" dirty="0" err="1">
+                <a:solidFill>
+                  <a:schemeClr val="bg1">
+                    <a:lumMod val="65000"/>
+                  </a:schemeClr>
+                </a:solidFill>
+              </a:rPr>
+              <a:t>Doglio</a:t>
+            </a:r>
+            <a:r>
+              <a:rPr lang="en-US" sz="800" dirty="0">
+                <a:solidFill>
+                  <a:schemeClr val="bg1">
+                    <a:lumMod val="65000"/>
+                  </a:schemeClr>
+                </a:solidFill>
+              </a:rPr>
+              <a:t>, Fernando: Pro REST API Development with Node.js</a:t>
+            </a:r>
+            <a:endParaRPr lang="de-DE" sz="800" dirty="0">
+              <a:solidFill>
+                <a:schemeClr val="bg1">
+                  <a:lumMod val="65000"/>
+                </a:schemeClr>
+              </a:solidFill>
+            </a:endParaRPr>
           </a:p>
         </p:txBody>
       </p:sp>
     </p:spTree>
     <p:extLst>
       <p:ext uri="{BB962C8B-B14F-4D97-AF65-F5344CB8AC3E}">
-        <p14:creationId xmlns:p14="http://schemas.microsoft.com/office/powerpoint/2010/main" val="529009510"/>
+        <p14:creationId xmlns:p14="http://schemas.microsoft.com/office/powerpoint/2010/main" val="3725002728"/>
       </p:ext>
     </p:extLst>
   </p:cSld>
@@ -6220,7 +6617,7 @@
           <p:cNvPr id="2" name="Titel 1">
             <a:extLst>
               <a:ext uri="{FF2B5EF4-FFF2-40B4-BE49-F238E27FC236}">
-                <a16:creationId xmlns:a16="http://schemas.microsoft.com/office/drawing/2014/main" id="{4313DBAB-207C-424C-BC7C-9EE08BFDECB5}"/>
+                <a16:creationId xmlns:a16="http://schemas.microsoft.com/office/drawing/2014/main" id="{30B5AA0E-363A-43C8-BA12-06D1722A094F}"/>
               </a:ext>
             </a:extLst>
           </p:cNvPr>
@@ -6237,70 +6634,89 @@
           <a:lstStyle/>
           <a:p>
             <a:r>
+              <a:rPr lang="de-DE" dirty="0"/>
+              <a:t>REST – </a:t>
+            </a:r>
+            <a:r>
               <a:rPr lang="de-DE" dirty="0" err="1"/>
-              <a:t>GraphQL</a:t>
+              <a:t>Layered</a:t>
             </a:r>
             <a:r>
               <a:rPr lang="de-DE" dirty="0"/>
-              <a:t> – Nachteile	</a:t>
-            </a:r>
-          </a:p>
-        </p:txBody>
-      </p:sp>
-      <p:sp>
-        <p:nvSpPr>
-          <p:cNvPr id="3" name="Inhaltsplatzhalter 2">
-            <a:extLst>
-              <a:ext uri="{FF2B5EF4-FFF2-40B4-BE49-F238E27FC236}">
-                <a16:creationId xmlns:a16="http://schemas.microsoft.com/office/drawing/2014/main" id="{06C2F158-F933-4662-A17F-9EE93040506D}"/>
-              </a:ext>
-            </a:extLst>
-          </p:cNvPr>
-          <p:cNvSpPr>
-            <a:spLocks noGrp="1"/>
-          </p:cNvSpPr>
+              <a:t> System 5/6</a:t>
+            </a:r>
+          </a:p>
+        </p:txBody>
+      </p:sp>
+      <p:pic>
+        <p:nvPicPr>
+          <p:cNvPr id="7" name="Inhaltsplatzhalter 6" descr="Ein Bild, das Screenshot enthält.&#10;&#10;Mit hoher Zuverlässigkeit generierte Beschreibung">
+            <a:extLst>
+              <a:ext uri="{FF2B5EF4-FFF2-40B4-BE49-F238E27FC236}">
+                <a16:creationId xmlns:a16="http://schemas.microsoft.com/office/drawing/2014/main" id="{EF152020-1554-4BE2-9F7E-298A20979E30}"/>
+              </a:ext>
+            </a:extLst>
+          </p:cNvPr>
+          <p:cNvPicPr>
+            <a:picLocks noGrp="1" noChangeAspect="1"/>
+          </p:cNvPicPr>
           <p:nvPr>
             <p:ph idx="1"/>
           </p:nvPr>
-        </p:nvSpPr>
-        <p:spPr/>
-        <p:txBody>
-          <a:bodyPr/>
-          <a:lstStyle/>
-          <a:p>
-            <a:r>
-              <a:rPr lang="de-DE" dirty="0"/>
-              <a:t>Standardmäßig kein Caching</a:t>
-            </a:r>
-          </a:p>
-          <a:p>
-            <a:pPr lvl="1"/>
-            <a:r>
-              <a:rPr lang="de-DE" dirty="0"/>
-              <a:t>Nur ermöglicht durch Client-Bibliotheken</a:t>
-            </a:r>
-          </a:p>
-          <a:p>
-            <a:r>
-              <a:rPr lang="de-DE" dirty="0"/>
-              <a:t>Kein Datei-Upload</a:t>
-            </a:r>
-          </a:p>
-          <a:p>
-            <a:pPr lvl="1"/>
-            <a:r>
-              <a:rPr lang="de-DE" dirty="0"/>
-              <a:t>Benötigt zusätzliche Bibliothek oder REST-API</a:t>
-            </a:r>
-          </a:p>
-        </p:txBody>
-      </p:sp>
-      <p:sp>
-        <p:nvSpPr>
-          <p:cNvPr id="4" name="Foliennummernplatzhalter 3">
-            <a:extLst>
-              <a:ext uri="{FF2B5EF4-FFF2-40B4-BE49-F238E27FC236}">
-                <a16:creationId xmlns:a16="http://schemas.microsoft.com/office/drawing/2014/main" id="{558347A6-8815-4A12-BAEA-CE3C5FB49B68}"/>
+        </p:nvPicPr>
+        <p:blipFill>
+          <a:blip r:embed="rId2">
+            <a:extLst>
+              <a:ext uri="{28A0092B-C50C-407E-A947-70E740481C1C}">
+                <a14:useLocalDpi xmlns:a14="http://schemas.microsoft.com/office/drawing/2010/main" val="0"/>
+              </a:ext>
+            </a:extLst>
+          </a:blip>
+          <a:stretch>
+            <a:fillRect/>
+          </a:stretch>
+        </p:blipFill>
+        <p:spPr>
+          <a:xfrm>
+            <a:off x="2806826" y="2286000"/>
+            <a:ext cx="6154486" cy="4022725"/>
+          </a:xfrm>
+        </p:spPr>
+      </p:pic>
+      <p:sp>
+        <p:nvSpPr>
+          <p:cNvPr id="4" name="Fußzeilenplatzhalter 3">
+            <a:extLst>
+              <a:ext uri="{FF2B5EF4-FFF2-40B4-BE49-F238E27FC236}">
+                <a16:creationId xmlns:a16="http://schemas.microsoft.com/office/drawing/2014/main" id="{87515C34-A0CB-4E6F-BE4C-E9609A387C38}"/>
+              </a:ext>
+            </a:extLst>
+          </p:cNvPr>
+          <p:cNvSpPr>
+            <a:spLocks noGrp="1"/>
+          </p:cNvSpPr>
+          <p:nvPr>
+            <p:ph type="ftr" sz="quarter" idx="11"/>
+          </p:nvPr>
+        </p:nvSpPr>
+        <p:spPr/>
+        <p:txBody>
+          <a:bodyPr/>
+          <a:lstStyle/>
+          <a:p>
+            <a:r>
+              <a:rPr lang="de-DE"/>
+              <a:t>Fynn Klöpper - NodeJS &amp; API-Technologien</a:t>
+            </a:r>
+          </a:p>
+        </p:txBody>
+      </p:sp>
+      <p:sp>
+        <p:nvSpPr>
+          <p:cNvPr id="5" name="Foliennummernplatzhalter 4">
+            <a:extLst>
+              <a:ext uri="{FF2B5EF4-FFF2-40B4-BE49-F238E27FC236}">
+                <a16:creationId xmlns:a16="http://schemas.microsoft.com/office/drawing/2014/main" id="{2FA1E072-1211-45B9-9727-CC9D9AAEA7D3}"/>
               </a:ext>
             </a:extLst>
           </p:cNvPr>
@@ -6319,6 +6735,1175 @@
             <a:fld id="{25CE93BE-EA2B-4B23-A2D3-372777BB019B}" type="slidenum">
               <a:rPr lang="de-DE" smtClean="0"/>
               <a:t>23</a:t>
+            </a:fld>
+            <a:endParaRPr lang="de-DE"/>
+          </a:p>
+        </p:txBody>
+      </p:sp>
+      <p:sp>
+        <p:nvSpPr>
+          <p:cNvPr id="8" name="Textfeld 7">
+            <a:extLst>
+              <a:ext uri="{FF2B5EF4-FFF2-40B4-BE49-F238E27FC236}">
+                <a16:creationId xmlns:a16="http://schemas.microsoft.com/office/drawing/2014/main" id="{45C4E8B4-06BC-4594-B632-135442E030E5}"/>
+              </a:ext>
+            </a:extLst>
+          </p:cNvPr>
+          <p:cNvSpPr txBox="1"/>
+          <p:nvPr/>
+        </p:nvSpPr>
+        <p:spPr>
+          <a:xfrm>
+            <a:off x="3882787" y="6174271"/>
+            <a:ext cx="2547492" cy="215444"/>
+          </a:xfrm>
+          <a:prstGeom prst="rect">
+            <a:avLst/>
+          </a:prstGeom>
+          <a:noFill/>
+        </p:spPr>
+        <p:txBody>
+          <a:bodyPr wrap="none" rtlCol="0">
+            <a:spAutoFit/>
+          </a:bodyPr>
+          <a:lstStyle/>
+          <a:p>
+            <a:r>
+              <a:rPr lang="en-US" sz="800" dirty="0" err="1">
+                <a:solidFill>
+                  <a:schemeClr val="bg1">
+                    <a:lumMod val="65000"/>
+                  </a:schemeClr>
+                </a:solidFill>
+              </a:rPr>
+              <a:t>Doglio</a:t>
+            </a:r>
+            <a:r>
+              <a:rPr lang="en-US" sz="800" dirty="0">
+                <a:solidFill>
+                  <a:schemeClr val="bg1">
+                    <a:lumMod val="65000"/>
+                  </a:schemeClr>
+                </a:solidFill>
+              </a:rPr>
+              <a:t>, Fernando: Pro REST API Development with Node.js</a:t>
+            </a:r>
+            <a:endParaRPr lang="de-DE" sz="800" dirty="0">
+              <a:solidFill>
+                <a:schemeClr val="bg1">
+                  <a:lumMod val="65000"/>
+                </a:schemeClr>
+              </a:solidFill>
+            </a:endParaRPr>
+          </a:p>
+        </p:txBody>
+      </p:sp>
+    </p:spTree>
+    <p:extLst>
+      <p:ext uri="{BB962C8B-B14F-4D97-AF65-F5344CB8AC3E}">
+        <p14:creationId xmlns:p14="http://schemas.microsoft.com/office/powerpoint/2010/main" val="3368937277"/>
+      </p:ext>
+    </p:extLst>
+  </p:cSld>
+  <p:clrMapOvr>
+    <a:masterClrMapping/>
+  </p:clrMapOvr>
+</p:sld>
+</file>
+
+<file path=ppt/slides/slide24.xml><?xml version="1.0" encoding="utf-8"?>
+<p:sld xmlns:a="http://schemas.openxmlformats.org/drawingml/2006/main" xmlns:r="http://schemas.openxmlformats.org/officeDocument/2006/relationships" xmlns:p="http://schemas.openxmlformats.org/presentationml/2006/main">
+  <p:cSld>
+    <p:spTree>
+      <p:nvGrpSpPr>
+        <p:cNvPr id="1" name=""/>
+        <p:cNvGrpSpPr/>
+        <p:nvPr/>
+      </p:nvGrpSpPr>
+      <p:grpSpPr>
+        <a:xfrm>
+          <a:off x="0" y="0"/>
+          <a:ext cx="0" cy="0"/>
+          <a:chOff x="0" y="0"/>
+          <a:chExt cx="0" cy="0"/>
+        </a:xfrm>
+      </p:grpSpPr>
+      <p:sp>
+        <p:nvSpPr>
+          <p:cNvPr id="2" name="Titel 1">
+            <a:extLst>
+              <a:ext uri="{FF2B5EF4-FFF2-40B4-BE49-F238E27FC236}">
+                <a16:creationId xmlns:a16="http://schemas.microsoft.com/office/drawing/2014/main" id="{61626C58-3DF5-4408-843A-77E79E25FA89}"/>
+              </a:ext>
+            </a:extLst>
+          </p:cNvPr>
+          <p:cNvSpPr>
+            <a:spLocks noGrp="1"/>
+          </p:cNvSpPr>
+          <p:nvPr>
+            <p:ph type="title"/>
+          </p:nvPr>
+        </p:nvSpPr>
+        <p:spPr/>
+        <p:txBody>
+          <a:bodyPr/>
+          <a:lstStyle/>
+          <a:p>
+            <a:r>
+              <a:rPr lang="de-DE" dirty="0"/>
+              <a:t>REST – Code-On-Demand 6/6</a:t>
+            </a:r>
+          </a:p>
+        </p:txBody>
+      </p:sp>
+      <p:pic>
+        <p:nvPicPr>
+          <p:cNvPr id="7" name="Inhaltsplatzhalter 6">
+            <a:extLst>
+              <a:ext uri="{FF2B5EF4-FFF2-40B4-BE49-F238E27FC236}">
+                <a16:creationId xmlns:a16="http://schemas.microsoft.com/office/drawing/2014/main" id="{05F7CD49-FD5F-4B8E-BA88-960DD5236950}"/>
+              </a:ext>
+            </a:extLst>
+          </p:cNvPr>
+          <p:cNvPicPr>
+            <a:picLocks noGrp="1" noChangeAspect="1"/>
+          </p:cNvPicPr>
+          <p:nvPr>
+            <p:ph idx="1"/>
+          </p:nvPr>
+        </p:nvPicPr>
+        <p:blipFill>
+          <a:blip r:embed="rId2">
+            <a:extLst>
+              <a:ext uri="{28A0092B-C50C-407E-A947-70E740481C1C}">
+                <a14:useLocalDpi xmlns:a14="http://schemas.microsoft.com/office/drawing/2010/main" val="0"/>
+              </a:ext>
+            </a:extLst>
+          </a:blip>
+          <a:stretch>
+            <a:fillRect/>
+          </a:stretch>
+        </p:blipFill>
+        <p:spPr>
+          <a:xfrm>
+            <a:off x="2588133" y="2552231"/>
+            <a:ext cx="6591871" cy="3490262"/>
+          </a:xfrm>
+        </p:spPr>
+      </p:pic>
+      <p:sp>
+        <p:nvSpPr>
+          <p:cNvPr id="4" name="Fußzeilenplatzhalter 3">
+            <a:extLst>
+              <a:ext uri="{FF2B5EF4-FFF2-40B4-BE49-F238E27FC236}">
+                <a16:creationId xmlns:a16="http://schemas.microsoft.com/office/drawing/2014/main" id="{A890E857-8F5F-470A-A4EF-32694C0966AC}"/>
+              </a:ext>
+            </a:extLst>
+          </p:cNvPr>
+          <p:cNvSpPr>
+            <a:spLocks noGrp="1"/>
+          </p:cNvSpPr>
+          <p:nvPr>
+            <p:ph type="ftr" sz="quarter" idx="11"/>
+          </p:nvPr>
+        </p:nvSpPr>
+        <p:spPr/>
+        <p:txBody>
+          <a:bodyPr/>
+          <a:lstStyle/>
+          <a:p>
+            <a:r>
+              <a:rPr lang="de-DE"/>
+              <a:t>Fynn Klöpper - NodeJS &amp; API-Technologien</a:t>
+            </a:r>
+          </a:p>
+        </p:txBody>
+      </p:sp>
+      <p:sp>
+        <p:nvSpPr>
+          <p:cNvPr id="5" name="Foliennummernplatzhalter 4">
+            <a:extLst>
+              <a:ext uri="{FF2B5EF4-FFF2-40B4-BE49-F238E27FC236}">
+                <a16:creationId xmlns:a16="http://schemas.microsoft.com/office/drawing/2014/main" id="{33691C06-F25C-4BD8-BD56-E7FEC1D12538}"/>
+              </a:ext>
+            </a:extLst>
+          </p:cNvPr>
+          <p:cNvSpPr>
+            <a:spLocks noGrp="1"/>
+          </p:cNvSpPr>
+          <p:nvPr>
+            <p:ph type="sldNum" sz="quarter" idx="12"/>
+          </p:nvPr>
+        </p:nvSpPr>
+        <p:spPr/>
+        <p:txBody>
+          <a:bodyPr/>
+          <a:lstStyle/>
+          <a:p>
+            <a:fld id="{25CE93BE-EA2B-4B23-A2D3-372777BB019B}" type="slidenum">
+              <a:rPr lang="de-DE" smtClean="0"/>
+              <a:t>24</a:t>
+            </a:fld>
+            <a:endParaRPr lang="de-DE"/>
+          </a:p>
+        </p:txBody>
+      </p:sp>
+      <p:sp>
+        <p:nvSpPr>
+          <p:cNvPr id="8" name="Textfeld 7">
+            <a:extLst>
+              <a:ext uri="{FF2B5EF4-FFF2-40B4-BE49-F238E27FC236}">
+                <a16:creationId xmlns:a16="http://schemas.microsoft.com/office/drawing/2014/main" id="{E8E83B8F-3D16-4C7A-8247-5377DC95E06F}"/>
+              </a:ext>
+            </a:extLst>
+          </p:cNvPr>
+          <p:cNvSpPr txBox="1"/>
+          <p:nvPr/>
+        </p:nvSpPr>
+        <p:spPr>
+          <a:xfrm>
+            <a:off x="4296025" y="5934771"/>
+            <a:ext cx="2547492" cy="215444"/>
+          </a:xfrm>
+          <a:prstGeom prst="rect">
+            <a:avLst/>
+          </a:prstGeom>
+          <a:noFill/>
+        </p:spPr>
+        <p:txBody>
+          <a:bodyPr wrap="none" rtlCol="0">
+            <a:spAutoFit/>
+          </a:bodyPr>
+          <a:lstStyle/>
+          <a:p>
+            <a:r>
+              <a:rPr lang="en-US" sz="800" dirty="0" err="1">
+                <a:solidFill>
+                  <a:schemeClr val="bg1">
+                    <a:lumMod val="65000"/>
+                  </a:schemeClr>
+                </a:solidFill>
+              </a:rPr>
+              <a:t>Doglio</a:t>
+            </a:r>
+            <a:r>
+              <a:rPr lang="en-US" sz="800" dirty="0">
+                <a:solidFill>
+                  <a:schemeClr val="bg1">
+                    <a:lumMod val="65000"/>
+                  </a:schemeClr>
+                </a:solidFill>
+              </a:rPr>
+              <a:t>, Fernando: Pro REST API Development with Node.js</a:t>
+            </a:r>
+            <a:endParaRPr lang="de-DE" sz="800" dirty="0">
+              <a:solidFill>
+                <a:schemeClr val="bg1">
+                  <a:lumMod val="65000"/>
+                </a:schemeClr>
+              </a:solidFill>
+            </a:endParaRPr>
+          </a:p>
+        </p:txBody>
+      </p:sp>
+    </p:spTree>
+    <p:extLst>
+      <p:ext uri="{BB962C8B-B14F-4D97-AF65-F5344CB8AC3E}">
+        <p14:creationId xmlns:p14="http://schemas.microsoft.com/office/powerpoint/2010/main" val="3190014975"/>
+      </p:ext>
+    </p:extLst>
+  </p:cSld>
+  <p:clrMapOvr>
+    <a:masterClrMapping/>
+  </p:clrMapOvr>
+</p:sld>
+</file>
+
+<file path=ppt/slides/slide25.xml><?xml version="1.0" encoding="utf-8"?>
+<p:sld xmlns:a="http://schemas.openxmlformats.org/drawingml/2006/main" xmlns:r="http://schemas.openxmlformats.org/officeDocument/2006/relationships" xmlns:p="http://schemas.openxmlformats.org/presentationml/2006/main">
+  <p:cSld>
+    <p:spTree>
+      <p:nvGrpSpPr>
+        <p:cNvPr id="1" name=""/>
+        <p:cNvGrpSpPr/>
+        <p:nvPr/>
+      </p:nvGrpSpPr>
+      <p:grpSpPr>
+        <a:xfrm>
+          <a:off x="0" y="0"/>
+          <a:ext cx="0" cy="0"/>
+          <a:chOff x="0" y="0"/>
+          <a:chExt cx="0" cy="0"/>
+        </a:xfrm>
+      </p:grpSpPr>
+      <p:sp>
+        <p:nvSpPr>
+          <p:cNvPr id="2" name="Titel 1">
+            <a:extLst>
+              <a:ext uri="{FF2B5EF4-FFF2-40B4-BE49-F238E27FC236}">
+                <a16:creationId xmlns:a16="http://schemas.microsoft.com/office/drawing/2014/main" id="{C60DCF6D-DFC3-41E1-BA88-32A1F44B82F0}"/>
+              </a:ext>
+            </a:extLst>
+          </p:cNvPr>
+          <p:cNvSpPr>
+            <a:spLocks noGrp="1"/>
+          </p:cNvSpPr>
+          <p:nvPr>
+            <p:ph type="title"/>
+          </p:nvPr>
+        </p:nvSpPr>
+        <p:spPr/>
+        <p:txBody>
+          <a:bodyPr/>
+          <a:lstStyle/>
+          <a:p>
+            <a:r>
+              <a:rPr lang="de-DE" dirty="0"/>
+              <a:t>REST – Vorteile	</a:t>
+            </a:r>
+          </a:p>
+        </p:txBody>
+      </p:sp>
+      <p:sp>
+        <p:nvSpPr>
+          <p:cNvPr id="3" name="Inhaltsplatzhalter 2">
+            <a:extLst>
+              <a:ext uri="{FF2B5EF4-FFF2-40B4-BE49-F238E27FC236}">
+                <a16:creationId xmlns:a16="http://schemas.microsoft.com/office/drawing/2014/main" id="{704CFC4F-BC3F-460C-9A33-FB4D07DB058F}"/>
+              </a:ext>
+            </a:extLst>
+          </p:cNvPr>
+          <p:cNvSpPr>
+            <a:spLocks noGrp="1"/>
+          </p:cNvSpPr>
+          <p:nvPr>
+            <p:ph idx="1"/>
+          </p:nvPr>
+        </p:nvSpPr>
+        <p:spPr/>
+        <p:txBody>
+          <a:bodyPr/>
+          <a:lstStyle/>
+          <a:p>
+            <a:r>
+              <a:rPr lang="de-DE" dirty="0"/>
+              <a:t>Ausgereifte Lösung</a:t>
+            </a:r>
+          </a:p>
+          <a:p>
+            <a:pPr marL="0" indent="0">
+              <a:buNone/>
+            </a:pPr>
+            <a:r>
+              <a:rPr lang="de-DE" dirty="0"/>
+              <a:t> Leitfaden durch HATEOAS</a:t>
+            </a:r>
+          </a:p>
+        </p:txBody>
+      </p:sp>
+      <p:sp>
+        <p:nvSpPr>
+          <p:cNvPr id="4" name="Foliennummernplatzhalter 3">
+            <a:extLst>
+              <a:ext uri="{FF2B5EF4-FFF2-40B4-BE49-F238E27FC236}">
+                <a16:creationId xmlns:a16="http://schemas.microsoft.com/office/drawing/2014/main" id="{64E4DB4D-C5D3-4C45-973C-8F7D3D86C06E}"/>
+              </a:ext>
+            </a:extLst>
+          </p:cNvPr>
+          <p:cNvSpPr>
+            <a:spLocks noGrp="1"/>
+          </p:cNvSpPr>
+          <p:nvPr>
+            <p:ph type="sldNum" sz="quarter" idx="12"/>
+          </p:nvPr>
+        </p:nvSpPr>
+        <p:spPr/>
+        <p:txBody>
+          <a:bodyPr/>
+          <a:lstStyle/>
+          <a:p>
+            <a:fld id="{25CE93BE-EA2B-4B23-A2D3-372777BB019B}" type="slidenum">
+              <a:rPr lang="de-DE" smtClean="0"/>
+              <a:t>25</a:t>
+            </a:fld>
+            <a:endParaRPr lang="de-DE"/>
+          </a:p>
+        </p:txBody>
+      </p:sp>
+      <p:sp>
+        <p:nvSpPr>
+          <p:cNvPr id="5" name="Fußzeilenplatzhalter 4">
+            <a:extLst>
+              <a:ext uri="{FF2B5EF4-FFF2-40B4-BE49-F238E27FC236}">
+                <a16:creationId xmlns:a16="http://schemas.microsoft.com/office/drawing/2014/main" id="{A4500EF7-95F6-4624-B945-711375B4339E}"/>
+              </a:ext>
+            </a:extLst>
+          </p:cNvPr>
+          <p:cNvSpPr>
+            <a:spLocks noGrp="1"/>
+          </p:cNvSpPr>
+          <p:nvPr>
+            <p:ph type="ftr" sz="quarter" idx="11"/>
+          </p:nvPr>
+        </p:nvSpPr>
+        <p:spPr/>
+        <p:txBody>
+          <a:bodyPr/>
+          <a:lstStyle/>
+          <a:p>
+            <a:r>
+              <a:rPr lang="de-DE"/>
+              <a:t>Fynn Klöpper - NodeJS &amp; API-Technologien</a:t>
+            </a:r>
+          </a:p>
+        </p:txBody>
+      </p:sp>
+    </p:spTree>
+    <p:extLst>
+      <p:ext uri="{BB962C8B-B14F-4D97-AF65-F5344CB8AC3E}">
+        <p14:creationId xmlns:p14="http://schemas.microsoft.com/office/powerpoint/2010/main" val="702001325"/>
+      </p:ext>
+    </p:extLst>
+  </p:cSld>
+  <p:clrMapOvr>
+    <a:masterClrMapping/>
+  </p:clrMapOvr>
+</p:sld>
+</file>
+
+<file path=ppt/slides/slide26.xml><?xml version="1.0" encoding="utf-8"?>
+<p:sld xmlns:a="http://schemas.openxmlformats.org/drawingml/2006/main" xmlns:r="http://schemas.openxmlformats.org/officeDocument/2006/relationships" xmlns:p="http://schemas.openxmlformats.org/presentationml/2006/main">
+  <p:cSld>
+    <p:spTree>
+      <p:nvGrpSpPr>
+        <p:cNvPr id="1" name=""/>
+        <p:cNvGrpSpPr/>
+        <p:nvPr/>
+      </p:nvGrpSpPr>
+      <p:grpSpPr>
+        <a:xfrm>
+          <a:off x="0" y="0"/>
+          <a:ext cx="0" cy="0"/>
+          <a:chOff x="0" y="0"/>
+          <a:chExt cx="0" cy="0"/>
+        </a:xfrm>
+      </p:grpSpPr>
+      <p:sp>
+        <p:nvSpPr>
+          <p:cNvPr id="2" name="Titel 1">
+            <a:extLst>
+              <a:ext uri="{FF2B5EF4-FFF2-40B4-BE49-F238E27FC236}">
+                <a16:creationId xmlns:a16="http://schemas.microsoft.com/office/drawing/2014/main" id="{53923327-9D48-4395-8352-33E813C3DD22}"/>
+              </a:ext>
+            </a:extLst>
+          </p:cNvPr>
+          <p:cNvSpPr>
+            <a:spLocks noGrp="1"/>
+          </p:cNvSpPr>
+          <p:nvPr>
+            <p:ph type="title"/>
+          </p:nvPr>
+        </p:nvSpPr>
+        <p:spPr/>
+        <p:txBody>
+          <a:bodyPr/>
+          <a:lstStyle/>
+          <a:p>
+            <a:r>
+              <a:rPr lang="de-DE" dirty="0"/>
+              <a:t>REST – Nachteile	</a:t>
+            </a:r>
+          </a:p>
+        </p:txBody>
+      </p:sp>
+      <p:sp>
+        <p:nvSpPr>
+          <p:cNvPr id="3" name="Inhaltsplatzhalter 2">
+            <a:extLst>
+              <a:ext uri="{FF2B5EF4-FFF2-40B4-BE49-F238E27FC236}">
+                <a16:creationId xmlns:a16="http://schemas.microsoft.com/office/drawing/2014/main" id="{E485ACFA-5E0B-429B-B08A-BB98F34E56F4}"/>
+              </a:ext>
+            </a:extLst>
+          </p:cNvPr>
+          <p:cNvSpPr>
+            <a:spLocks noGrp="1"/>
+          </p:cNvSpPr>
+          <p:nvPr>
+            <p:ph idx="1"/>
+          </p:nvPr>
+        </p:nvSpPr>
+        <p:spPr/>
+        <p:txBody>
+          <a:bodyPr/>
+          <a:lstStyle/>
+          <a:p>
+            <a:r>
+              <a:rPr lang="de-DE" dirty="0"/>
+              <a:t>Fehlerhafte REST-Implementierungen</a:t>
+            </a:r>
+          </a:p>
+          <a:p>
+            <a:r>
+              <a:rPr lang="de-DE" dirty="0"/>
+              <a:t>Overhead durch die Prinzipien</a:t>
+            </a:r>
+          </a:p>
+        </p:txBody>
+      </p:sp>
+      <p:sp>
+        <p:nvSpPr>
+          <p:cNvPr id="4" name="Foliennummernplatzhalter 3">
+            <a:extLst>
+              <a:ext uri="{FF2B5EF4-FFF2-40B4-BE49-F238E27FC236}">
+                <a16:creationId xmlns:a16="http://schemas.microsoft.com/office/drawing/2014/main" id="{CD72727C-9F6D-4C5A-BD08-608D59DFFCAC}"/>
+              </a:ext>
+            </a:extLst>
+          </p:cNvPr>
+          <p:cNvSpPr>
+            <a:spLocks noGrp="1"/>
+          </p:cNvSpPr>
+          <p:nvPr>
+            <p:ph type="sldNum" sz="quarter" idx="12"/>
+          </p:nvPr>
+        </p:nvSpPr>
+        <p:spPr/>
+        <p:txBody>
+          <a:bodyPr/>
+          <a:lstStyle/>
+          <a:p>
+            <a:fld id="{25CE93BE-EA2B-4B23-A2D3-372777BB019B}" type="slidenum">
+              <a:rPr lang="de-DE" smtClean="0"/>
+              <a:t>26</a:t>
+            </a:fld>
+            <a:endParaRPr lang="de-DE"/>
+          </a:p>
+        </p:txBody>
+      </p:sp>
+      <p:sp>
+        <p:nvSpPr>
+          <p:cNvPr id="5" name="Fußzeilenplatzhalter 4">
+            <a:extLst>
+              <a:ext uri="{FF2B5EF4-FFF2-40B4-BE49-F238E27FC236}">
+                <a16:creationId xmlns:a16="http://schemas.microsoft.com/office/drawing/2014/main" id="{61A01072-D868-4B95-B974-6FC176015352}"/>
+              </a:ext>
+            </a:extLst>
+          </p:cNvPr>
+          <p:cNvSpPr>
+            <a:spLocks noGrp="1"/>
+          </p:cNvSpPr>
+          <p:nvPr>
+            <p:ph type="ftr" sz="quarter" idx="11"/>
+          </p:nvPr>
+        </p:nvSpPr>
+        <p:spPr/>
+        <p:txBody>
+          <a:bodyPr/>
+          <a:lstStyle/>
+          <a:p>
+            <a:r>
+              <a:rPr lang="de-DE"/>
+              <a:t>Fynn Klöpper - NodeJS &amp; API-Technologien</a:t>
+            </a:r>
+          </a:p>
+        </p:txBody>
+      </p:sp>
+    </p:spTree>
+    <p:extLst>
+      <p:ext uri="{BB962C8B-B14F-4D97-AF65-F5344CB8AC3E}">
+        <p14:creationId xmlns:p14="http://schemas.microsoft.com/office/powerpoint/2010/main" val="1476592971"/>
+      </p:ext>
+    </p:extLst>
+  </p:cSld>
+  <p:clrMapOvr>
+    <a:masterClrMapping/>
+  </p:clrMapOvr>
+</p:sld>
+</file>
+
+<file path=ppt/slides/slide27.xml><?xml version="1.0" encoding="utf-8"?>
+<p:sld xmlns:a="http://schemas.openxmlformats.org/drawingml/2006/main" xmlns:r="http://schemas.openxmlformats.org/officeDocument/2006/relationships" xmlns:p="http://schemas.openxmlformats.org/presentationml/2006/main">
+  <p:cSld>
+    <p:spTree>
+      <p:nvGrpSpPr>
+        <p:cNvPr id="1" name=""/>
+        <p:cNvGrpSpPr/>
+        <p:nvPr/>
+      </p:nvGrpSpPr>
+      <p:grpSpPr>
+        <a:xfrm>
+          <a:off x="0" y="0"/>
+          <a:ext cx="0" cy="0"/>
+          <a:chOff x="0" y="0"/>
+          <a:chExt cx="0" cy="0"/>
+        </a:xfrm>
+      </p:grpSpPr>
+      <p:sp>
+        <p:nvSpPr>
+          <p:cNvPr id="2" name="Titel 1">
+            <a:extLst>
+              <a:ext uri="{FF2B5EF4-FFF2-40B4-BE49-F238E27FC236}">
+                <a16:creationId xmlns:a16="http://schemas.microsoft.com/office/drawing/2014/main" id="{AF1377FA-2435-4C65-A437-5DDAED4B5BAD}"/>
+              </a:ext>
+            </a:extLst>
+          </p:cNvPr>
+          <p:cNvSpPr>
+            <a:spLocks noGrp="1"/>
+          </p:cNvSpPr>
+          <p:nvPr>
+            <p:ph type="title"/>
+          </p:nvPr>
+        </p:nvSpPr>
+        <p:spPr/>
+        <p:txBody>
+          <a:bodyPr/>
+          <a:lstStyle/>
+          <a:p>
+            <a:r>
+              <a:rPr lang="de-DE" dirty="0" err="1"/>
+              <a:t>GraphQL</a:t>
+            </a:r>
+            <a:r>
+              <a:rPr lang="de-DE" dirty="0"/>
+              <a:t> – Allgemein	</a:t>
+            </a:r>
+          </a:p>
+        </p:txBody>
+      </p:sp>
+      <p:sp>
+        <p:nvSpPr>
+          <p:cNvPr id="3" name="Inhaltsplatzhalter 2">
+            <a:extLst>
+              <a:ext uri="{FF2B5EF4-FFF2-40B4-BE49-F238E27FC236}">
+                <a16:creationId xmlns:a16="http://schemas.microsoft.com/office/drawing/2014/main" id="{BBFFA9A4-04DF-41DD-A59E-8FAF4D695C4D}"/>
+              </a:ext>
+            </a:extLst>
+          </p:cNvPr>
+          <p:cNvSpPr>
+            <a:spLocks noGrp="1"/>
+          </p:cNvSpPr>
+          <p:nvPr>
+            <p:ph idx="1"/>
+          </p:nvPr>
+        </p:nvSpPr>
+        <p:spPr/>
+        <p:txBody>
+          <a:bodyPr/>
+          <a:lstStyle/>
+          <a:p>
+            <a:r>
+              <a:rPr lang="de-DE" dirty="0"/>
+              <a:t>Von Facebook entwickelt</a:t>
+            </a:r>
+          </a:p>
+          <a:p>
+            <a:r>
+              <a:rPr lang="de-DE" dirty="0"/>
+              <a:t>Query-Anfragen</a:t>
+            </a:r>
+          </a:p>
+          <a:p>
+            <a:r>
+              <a:rPr lang="de-DE" dirty="0"/>
+              <a:t>Viele Client-Arten</a:t>
+            </a:r>
+          </a:p>
+          <a:p>
+            <a:r>
+              <a:rPr lang="de-DE" dirty="0" err="1"/>
+              <a:t>GraphiQL</a:t>
+            </a:r>
+            <a:endParaRPr lang="de-DE" dirty="0"/>
+          </a:p>
+        </p:txBody>
+      </p:sp>
+      <p:sp>
+        <p:nvSpPr>
+          <p:cNvPr id="4" name="Foliennummernplatzhalter 3">
+            <a:extLst>
+              <a:ext uri="{FF2B5EF4-FFF2-40B4-BE49-F238E27FC236}">
+                <a16:creationId xmlns:a16="http://schemas.microsoft.com/office/drawing/2014/main" id="{C23B86B9-9FC0-4BFA-A85D-944AC024B436}"/>
+              </a:ext>
+            </a:extLst>
+          </p:cNvPr>
+          <p:cNvSpPr>
+            <a:spLocks noGrp="1"/>
+          </p:cNvSpPr>
+          <p:nvPr>
+            <p:ph type="sldNum" sz="quarter" idx="12"/>
+          </p:nvPr>
+        </p:nvSpPr>
+        <p:spPr/>
+        <p:txBody>
+          <a:bodyPr/>
+          <a:lstStyle/>
+          <a:p>
+            <a:fld id="{25CE93BE-EA2B-4B23-A2D3-372777BB019B}" type="slidenum">
+              <a:rPr lang="de-DE" smtClean="0"/>
+              <a:t>27</a:t>
+            </a:fld>
+            <a:endParaRPr lang="de-DE"/>
+          </a:p>
+        </p:txBody>
+      </p:sp>
+      <p:sp>
+        <p:nvSpPr>
+          <p:cNvPr id="5" name="Fußzeilenplatzhalter 4">
+            <a:extLst>
+              <a:ext uri="{FF2B5EF4-FFF2-40B4-BE49-F238E27FC236}">
+                <a16:creationId xmlns:a16="http://schemas.microsoft.com/office/drawing/2014/main" id="{F419DE5C-9E75-41CC-9A5C-4845AA2C2E60}"/>
+              </a:ext>
+            </a:extLst>
+          </p:cNvPr>
+          <p:cNvSpPr>
+            <a:spLocks noGrp="1"/>
+          </p:cNvSpPr>
+          <p:nvPr>
+            <p:ph type="ftr" sz="quarter" idx="11"/>
+          </p:nvPr>
+        </p:nvSpPr>
+        <p:spPr/>
+        <p:txBody>
+          <a:bodyPr/>
+          <a:lstStyle/>
+          <a:p>
+            <a:r>
+              <a:rPr lang="de-DE"/>
+              <a:t>Fynn Klöpper - NodeJS &amp; API-Technologien</a:t>
+            </a:r>
+          </a:p>
+        </p:txBody>
+      </p:sp>
+      <p:pic>
+        <p:nvPicPr>
+          <p:cNvPr id="1026" name="Picture 2" descr="File:GraphQL Logo.svg">
+            <a:extLst>
+              <a:ext uri="{FF2B5EF4-FFF2-40B4-BE49-F238E27FC236}">
+                <a16:creationId xmlns:a16="http://schemas.microsoft.com/office/drawing/2014/main" id="{58AC2E3E-F1B8-432B-B729-833EDE3D8F91}"/>
+              </a:ext>
+            </a:extLst>
+          </p:cNvPr>
+          <p:cNvPicPr>
+            <a:picLocks noChangeAspect="1" noChangeArrowheads="1"/>
+          </p:cNvPicPr>
+          <p:nvPr/>
+        </p:nvPicPr>
+        <p:blipFill>
+          <a:blip r:embed="rId2">
+            <a:extLst>
+              <a:ext uri="{28A0092B-C50C-407E-A947-70E740481C1C}">
+                <a14:useLocalDpi xmlns:a14="http://schemas.microsoft.com/office/drawing/2010/main" val="0"/>
+              </a:ext>
+            </a:extLst>
+          </a:blip>
+          <a:srcRect/>
+          <a:stretch>
+            <a:fillRect/>
+          </a:stretch>
+        </p:blipFill>
+        <p:spPr bwMode="auto">
+          <a:xfrm>
+            <a:off x="9387462" y="585216"/>
+            <a:ext cx="1937426" cy="1937426"/>
+          </a:xfrm>
+          <a:prstGeom prst="rect">
+            <a:avLst/>
+          </a:prstGeom>
+          <a:noFill/>
+          <a:extLst>
+            <a:ext uri="{909E8E84-426E-40DD-AFC4-6F175D3DCCD1}">
+              <a14:hiddenFill xmlns:a14="http://schemas.microsoft.com/office/drawing/2010/main">
+                <a:solidFill>
+                  <a:srgbClr val="FFFFFF"/>
+                </a:solidFill>
+              </a14:hiddenFill>
+            </a:ext>
+          </a:extLst>
+        </p:spPr>
+      </p:pic>
+      <p:sp>
+        <p:nvSpPr>
+          <p:cNvPr id="6" name="Textfeld 5">
+            <a:extLst>
+              <a:ext uri="{FF2B5EF4-FFF2-40B4-BE49-F238E27FC236}">
+                <a16:creationId xmlns:a16="http://schemas.microsoft.com/office/drawing/2014/main" id="{4D370A12-06AD-4031-9B03-BB9C4EB87E96}"/>
+              </a:ext>
+            </a:extLst>
+          </p:cNvPr>
+          <p:cNvSpPr txBox="1"/>
+          <p:nvPr/>
+        </p:nvSpPr>
+        <p:spPr>
+          <a:xfrm>
+            <a:off x="9133664" y="2576264"/>
+            <a:ext cx="2677336" cy="215444"/>
+          </a:xfrm>
+          <a:prstGeom prst="rect">
+            <a:avLst/>
+          </a:prstGeom>
+          <a:noFill/>
+        </p:spPr>
+        <p:txBody>
+          <a:bodyPr wrap="none" rtlCol="0">
+            <a:spAutoFit/>
+          </a:bodyPr>
+          <a:lstStyle/>
+          <a:p>
+            <a:r>
+              <a:rPr lang="de-DE" sz="800" dirty="0">
+                <a:solidFill>
+                  <a:schemeClr val="bg1">
+                    <a:lumMod val="65000"/>
+                  </a:schemeClr>
+                </a:solidFill>
+              </a:rPr>
+              <a:t>https://commons.wikimedia.org/wiki/File:GraphQL_Logo.svg</a:t>
+            </a:r>
+          </a:p>
+        </p:txBody>
+      </p:sp>
+      <p:pic>
+        <p:nvPicPr>
+          <p:cNvPr id="7" name="Grafik 6">
+            <a:extLst>
+              <a:ext uri="{FF2B5EF4-FFF2-40B4-BE49-F238E27FC236}">
+                <a16:creationId xmlns:a16="http://schemas.microsoft.com/office/drawing/2014/main" id="{F09281AC-AF95-4DDD-94E8-ABFB9D7D50C8}"/>
+              </a:ext>
+            </a:extLst>
+          </p:cNvPr>
+          <p:cNvPicPr>
+            <a:picLocks noChangeAspect="1"/>
+          </p:cNvPicPr>
+          <p:nvPr/>
+        </p:nvPicPr>
+        <p:blipFill>
+          <a:blip r:embed="rId3"/>
+          <a:stretch>
+            <a:fillRect/>
+          </a:stretch>
+        </p:blipFill>
+        <p:spPr>
+          <a:xfrm>
+            <a:off x="1147029" y="4575520"/>
+            <a:ext cx="2600325" cy="1209675"/>
+          </a:xfrm>
+          <a:prstGeom prst="rect">
+            <a:avLst/>
+          </a:prstGeom>
+          <a:ln>
+            <a:solidFill>
+              <a:schemeClr val="bg1">
+                <a:lumMod val="65000"/>
+              </a:schemeClr>
+            </a:solidFill>
+          </a:ln>
+        </p:spPr>
+      </p:pic>
+    </p:spTree>
+    <p:extLst>
+      <p:ext uri="{BB962C8B-B14F-4D97-AF65-F5344CB8AC3E}">
+        <p14:creationId xmlns:p14="http://schemas.microsoft.com/office/powerpoint/2010/main" val="4126727332"/>
+      </p:ext>
+    </p:extLst>
+  </p:cSld>
+  <p:clrMapOvr>
+    <a:masterClrMapping/>
+  </p:clrMapOvr>
+</p:sld>
+</file>
+
+<file path=ppt/slides/slide28.xml><?xml version="1.0" encoding="utf-8"?>
+<p:sld xmlns:a="http://schemas.openxmlformats.org/drawingml/2006/main" xmlns:r="http://schemas.openxmlformats.org/officeDocument/2006/relationships" xmlns:p="http://schemas.openxmlformats.org/presentationml/2006/main">
+  <p:cSld>
+    <p:spTree>
+      <p:nvGrpSpPr>
+        <p:cNvPr id="1" name=""/>
+        <p:cNvGrpSpPr/>
+        <p:nvPr/>
+      </p:nvGrpSpPr>
+      <p:grpSpPr>
+        <a:xfrm>
+          <a:off x="0" y="0"/>
+          <a:ext cx="0" cy="0"/>
+          <a:chOff x="0" y="0"/>
+          <a:chExt cx="0" cy="0"/>
+        </a:xfrm>
+      </p:grpSpPr>
+      <p:sp>
+        <p:nvSpPr>
+          <p:cNvPr id="2" name="Titel 1">
+            <a:extLst>
+              <a:ext uri="{FF2B5EF4-FFF2-40B4-BE49-F238E27FC236}">
+                <a16:creationId xmlns:a16="http://schemas.microsoft.com/office/drawing/2014/main" id="{53A4D78B-C815-4691-8C72-CDFD54B46C19}"/>
+              </a:ext>
+            </a:extLst>
+          </p:cNvPr>
+          <p:cNvSpPr>
+            <a:spLocks noGrp="1"/>
+          </p:cNvSpPr>
+          <p:nvPr>
+            <p:ph type="title"/>
+          </p:nvPr>
+        </p:nvSpPr>
+        <p:spPr/>
+        <p:txBody>
+          <a:bodyPr/>
+          <a:lstStyle/>
+          <a:p>
+            <a:r>
+              <a:rPr lang="de-DE" dirty="0" err="1"/>
+              <a:t>GraphQL</a:t>
+            </a:r>
+            <a:r>
+              <a:rPr lang="de-DE" dirty="0"/>
+              <a:t> – Vorteile	</a:t>
+            </a:r>
+          </a:p>
+        </p:txBody>
+      </p:sp>
+      <p:sp>
+        <p:nvSpPr>
+          <p:cNvPr id="3" name="Inhaltsplatzhalter 2">
+            <a:extLst>
+              <a:ext uri="{FF2B5EF4-FFF2-40B4-BE49-F238E27FC236}">
+                <a16:creationId xmlns:a16="http://schemas.microsoft.com/office/drawing/2014/main" id="{710910FD-8204-40B0-BE1A-28CC8547909F}"/>
+              </a:ext>
+            </a:extLst>
+          </p:cNvPr>
+          <p:cNvSpPr>
+            <a:spLocks noGrp="1"/>
+          </p:cNvSpPr>
+          <p:nvPr>
+            <p:ph idx="1"/>
+          </p:nvPr>
+        </p:nvSpPr>
+        <p:spPr/>
+        <p:txBody>
+          <a:bodyPr/>
+          <a:lstStyle/>
+          <a:p>
+            <a:r>
+              <a:rPr lang="de-DE" dirty="0"/>
+              <a:t>Optimale Datenrückgabe durch </a:t>
+            </a:r>
+            <a:r>
+              <a:rPr lang="de-DE" dirty="0" err="1"/>
+              <a:t>Queries</a:t>
+            </a:r>
+            <a:endParaRPr lang="de-DE" dirty="0"/>
+          </a:p>
+          <a:p>
+            <a:r>
+              <a:rPr lang="de-DE" dirty="0"/>
+              <a:t>Kein Over- / </a:t>
+            </a:r>
+            <a:r>
+              <a:rPr lang="de-DE" dirty="0" err="1"/>
+              <a:t>Underfetching</a:t>
+            </a:r>
+            <a:endParaRPr lang="de-DE" dirty="0"/>
+          </a:p>
+          <a:p>
+            <a:r>
+              <a:rPr lang="de-DE" dirty="0"/>
+              <a:t>Viele Client-Arten auf einmal bedient</a:t>
+            </a:r>
+          </a:p>
+          <a:p>
+            <a:endParaRPr lang="de-DE" dirty="0"/>
+          </a:p>
+        </p:txBody>
+      </p:sp>
+      <p:sp>
+        <p:nvSpPr>
+          <p:cNvPr id="4" name="Foliennummernplatzhalter 3">
+            <a:extLst>
+              <a:ext uri="{FF2B5EF4-FFF2-40B4-BE49-F238E27FC236}">
+                <a16:creationId xmlns:a16="http://schemas.microsoft.com/office/drawing/2014/main" id="{9EC3F893-3DE8-4575-839D-1917A4A2D563}"/>
+              </a:ext>
+            </a:extLst>
+          </p:cNvPr>
+          <p:cNvSpPr>
+            <a:spLocks noGrp="1"/>
+          </p:cNvSpPr>
+          <p:nvPr>
+            <p:ph type="sldNum" sz="quarter" idx="12"/>
+          </p:nvPr>
+        </p:nvSpPr>
+        <p:spPr/>
+        <p:txBody>
+          <a:bodyPr/>
+          <a:lstStyle/>
+          <a:p>
+            <a:fld id="{25CE93BE-EA2B-4B23-A2D3-372777BB019B}" type="slidenum">
+              <a:rPr lang="de-DE" smtClean="0"/>
+              <a:t>28</a:t>
+            </a:fld>
+            <a:endParaRPr lang="de-DE"/>
+          </a:p>
+        </p:txBody>
+      </p:sp>
+      <p:sp>
+        <p:nvSpPr>
+          <p:cNvPr id="5" name="Fußzeilenplatzhalter 4">
+            <a:extLst>
+              <a:ext uri="{FF2B5EF4-FFF2-40B4-BE49-F238E27FC236}">
+                <a16:creationId xmlns:a16="http://schemas.microsoft.com/office/drawing/2014/main" id="{666F5365-8717-4A4D-9D32-8CD14E43E700}"/>
+              </a:ext>
+            </a:extLst>
+          </p:cNvPr>
+          <p:cNvSpPr>
+            <a:spLocks noGrp="1"/>
+          </p:cNvSpPr>
+          <p:nvPr>
+            <p:ph type="ftr" sz="quarter" idx="11"/>
+          </p:nvPr>
+        </p:nvSpPr>
+        <p:spPr/>
+        <p:txBody>
+          <a:bodyPr/>
+          <a:lstStyle/>
+          <a:p>
+            <a:r>
+              <a:rPr lang="de-DE"/>
+              <a:t>Fynn Klöpper - NodeJS &amp; API-Technologien</a:t>
+            </a:r>
+          </a:p>
+        </p:txBody>
+      </p:sp>
+    </p:spTree>
+    <p:extLst>
+      <p:ext uri="{BB962C8B-B14F-4D97-AF65-F5344CB8AC3E}">
+        <p14:creationId xmlns:p14="http://schemas.microsoft.com/office/powerpoint/2010/main" val="529009510"/>
+      </p:ext>
+    </p:extLst>
+  </p:cSld>
+  <p:clrMapOvr>
+    <a:masterClrMapping/>
+  </p:clrMapOvr>
+</p:sld>
+</file>
+
+<file path=ppt/slides/slide29.xml><?xml version="1.0" encoding="utf-8"?>
+<p:sld xmlns:a="http://schemas.openxmlformats.org/drawingml/2006/main" xmlns:r="http://schemas.openxmlformats.org/officeDocument/2006/relationships" xmlns:p="http://schemas.openxmlformats.org/presentationml/2006/main">
+  <p:cSld>
+    <p:spTree>
+      <p:nvGrpSpPr>
+        <p:cNvPr id="1" name=""/>
+        <p:cNvGrpSpPr/>
+        <p:nvPr/>
+      </p:nvGrpSpPr>
+      <p:grpSpPr>
+        <a:xfrm>
+          <a:off x="0" y="0"/>
+          <a:ext cx="0" cy="0"/>
+          <a:chOff x="0" y="0"/>
+          <a:chExt cx="0" cy="0"/>
+        </a:xfrm>
+      </p:grpSpPr>
+      <p:sp>
+        <p:nvSpPr>
+          <p:cNvPr id="2" name="Titel 1">
+            <a:extLst>
+              <a:ext uri="{FF2B5EF4-FFF2-40B4-BE49-F238E27FC236}">
+                <a16:creationId xmlns:a16="http://schemas.microsoft.com/office/drawing/2014/main" id="{4313DBAB-207C-424C-BC7C-9EE08BFDECB5}"/>
+              </a:ext>
+            </a:extLst>
+          </p:cNvPr>
+          <p:cNvSpPr>
+            <a:spLocks noGrp="1"/>
+          </p:cNvSpPr>
+          <p:nvPr>
+            <p:ph type="title"/>
+          </p:nvPr>
+        </p:nvSpPr>
+        <p:spPr/>
+        <p:txBody>
+          <a:bodyPr/>
+          <a:lstStyle/>
+          <a:p>
+            <a:r>
+              <a:rPr lang="de-DE" dirty="0" err="1"/>
+              <a:t>GraphQL</a:t>
+            </a:r>
+            <a:r>
+              <a:rPr lang="de-DE" dirty="0"/>
+              <a:t> – Nachteile	</a:t>
+            </a:r>
+          </a:p>
+        </p:txBody>
+      </p:sp>
+      <p:sp>
+        <p:nvSpPr>
+          <p:cNvPr id="3" name="Inhaltsplatzhalter 2">
+            <a:extLst>
+              <a:ext uri="{FF2B5EF4-FFF2-40B4-BE49-F238E27FC236}">
+                <a16:creationId xmlns:a16="http://schemas.microsoft.com/office/drawing/2014/main" id="{06C2F158-F933-4662-A17F-9EE93040506D}"/>
+              </a:ext>
+            </a:extLst>
+          </p:cNvPr>
+          <p:cNvSpPr>
+            <a:spLocks noGrp="1"/>
+          </p:cNvSpPr>
+          <p:nvPr>
+            <p:ph idx="1"/>
+          </p:nvPr>
+        </p:nvSpPr>
+        <p:spPr/>
+        <p:txBody>
+          <a:bodyPr/>
+          <a:lstStyle/>
+          <a:p>
+            <a:r>
+              <a:rPr lang="de-DE" dirty="0"/>
+              <a:t>Standardmäßig kein Caching</a:t>
+            </a:r>
+          </a:p>
+          <a:p>
+            <a:pPr lvl="1"/>
+            <a:r>
+              <a:rPr lang="de-DE" dirty="0"/>
+              <a:t>Nur ermöglicht durch Client-Bibliotheken</a:t>
+            </a:r>
+          </a:p>
+          <a:p>
+            <a:r>
+              <a:rPr lang="de-DE" dirty="0"/>
+              <a:t>Kein Datei-Upload</a:t>
+            </a:r>
+          </a:p>
+          <a:p>
+            <a:pPr lvl="1"/>
+            <a:r>
+              <a:rPr lang="de-DE" dirty="0"/>
+              <a:t>Benötigt zusätzliche Bibliothek oder REST-API</a:t>
+            </a:r>
+          </a:p>
+        </p:txBody>
+      </p:sp>
+      <p:sp>
+        <p:nvSpPr>
+          <p:cNvPr id="4" name="Foliennummernplatzhalter 3">
+            <a:extLst>
+              <a:ext uri="{FF2B5EF4-FFF2-40B4-BE49-F238E27FC236}">
+                <a16:creationId xmlns:a16="http://schemas.microsoft.com/office/drawing/2014/main" id="{558347A6-8815-4A12-BAEA-CE3C5FB49B68}"/>
+              </a:ext>
+            </a:extLst>
+          </p:cNvPr>
+          <p:cNvSpPr>
+            <a:spLocks noGrp="1"/>
+          </p:cNvSpPr>
+          <p:nvPr>
+            <p:ph type="sldNum" sz="quarter" idx="12"/>
+          </p:nvPr>
+        </p:nvSpPr>
+        <p:spPr/>
+        <p:txBody>
+          <a:bodyPr/>
+          <a:lstStyle/>
+          <a:p>
+            <a:fld id="{25CE93BE-EA2B-4B23-A2D3-372777BB019B}" type="slidenum">
+              <a:rPr lang="de-DE" smtClean="0"/>
+              <a:t>29</a:t>
             </a:fld>
             <a:endParaRPr lang="de-DE"/>
           </a:p>
@@ -6365,7 +7950,280 @@
 </p:sld>
 </file>
 
-<file path=ppt/slides/slide24.xml><?xml version="1.0" encoding="utf-8"?>
+<file path=ppt/slides/slide3.xml><?xml version="1.0" encoding="utf-8"?>
+<p:sld xmlns:a="http://schemas.openxmlformats.org/drawingml/2006/main" xmlns:r="http://schemas.openxmlformats.org/officeDocument/2006/relationships" xmlns:p="http://schemas.openxmlformats.org/presentationml/2006/main">
+  <p:cSld>
+    <p:spTree>
+      <p:nvGrpSpPr>
+        <p:cNvPr id="1" name=""/>
+        <p:cNvGrpSpPr/>
+        <p:nvPr/>
+      </p:nvGrpSpPr>
+      <p:grpSpPr>
+        <a:xfrm>
+          <a:off x="0" y="0"/>
+          <a:ext cx="0" cy="0"/>
+          <a:chOff x="0" y="0"/>
+          <a:chExt cx="0" cy="0"/>
+        </a:xfrm>
+      </p:grpSpPr>
+      <p:sp>
+        <p:nvSpPr>
+          <p:cNvPr id="2" name="Titel 1">
+            <a:extLst>
+              <a:ext uri="{FF2B5EF4-FFF2-40B4-BE49-F238E27FC236}">
+                <a16:creationId xmlns:a16="http://schemas.microsoft.com/office/drawing/2014/main" id="{C3C79C69-DBB1-47EC-865B-F8177BCDD62A}"/>
+              </a:ext>
+            </a:extLst>
+          </p:cNvPr>
+          <p:cNvSpPr>
+            <a:spLocks noGrp="1"/>
+          </p:cNvSpPr>
+          <p:nvPr>
+            <p:ph type="title"/>
+          </p:nvPr>
+        </p:nvSpPr>
+        <p:spPr/>
+        <p:txBody>
+          <a:bodyPr/>
+          <a:lstStyle/>
+          <a:p>
+            <a:r>
+              <a:rPr lang="de-DE" dirty="0" err="1"/>
+              <a:t>NodeJS</a:t>
+            </a:r>
+            <a:r>
+              <a:rPr lang="de-DE" dirty="0"/>
+              <a:t> – Allgemein	</a:t>
+            </a:r>
+          </a:p>
+        </p:txBody>
+      </p:sp>
+      <p:sp>
+        <p:nvSpPr>
+          <p:cNvPr id="3" name="Inhaltsplatzhalter 2">
+            <a:extLst>
+              <a:ext uri="{FF2B5EF4-FFF2-40B4-BE49-F238E27FC236}">
+                <a16:creationId xmlns:a16="http://schemas.microsoft.com/office/drawing/2014/main" id="{F04973C5-AEBF-40B6-A649-44B2F3B12A15}"/>
+              </a:ext>
+            </a:extLst>
+          </p:cNvPr>
+          <p:cNvSpPr>
+            <a:spLocks noGrp="1"/>
+          </p:cNvSpPr>
+          <p:nvPr>
+            <p:ph idx="1"/>
+          </p:nvPr>
+        </p:nvSpPr>
+        <p:spPr/>
+        <p:txBody>
+          <a:bodyPr/>
+          <a:lstStyle/>
+          <a:p>
+            <a:r>
+              <a:rPr lang="de-DE" dirty="0"/>
+              <a:t>Serverseitiges Ausführen von JavaScript</a:t>
+            </a:r>
+          </a:p>
+          <a:p>
+            <a:r>
+              <a:rPr lang="de-DE" dirty="0"/>
+              <a:t>Google </a:t>
+            </a:r>
+            <a:r>
+              <a:rPr lang="de-DE" dirty="0" err="1"/>
+              <a:t>Chrome‘s</a:t>
+            </a:r>
+            <a:r>
+              <a:rPr lang="de-DE" dirty="0"/>
+              <a:t> JavaScript-Laufzeitumgebung V8 </a:t>
+            </a:r>
+          </a:p>
+          <a:p>
+            <a:r>
+              <a:rPr lang="de-DE" dirty="0"/>
+              <a:t>Skalierbare Netzwerkanwendungen</a:t>
+            </a:r>
+          </a:p>
+          <a:p>
+            <a:r>
+              <a:rPr lang="de-DE" dirty="0"/>
+              <a:t>NPM</a:t>
+            </a:r>
+          </a:p>
+        </p:txBody>
+      </p:sp>
+      <p:sp>
+        <p:nvSpPr>
+          <p:cNvPr id="4" name="Foliennummernplatzhalter 3">
+            <a:extLst>
+              <a:ext uri="{FF2B5EF4-FFF2-40B4-BE49-F238E27FC236}">
+                <a16:creationId xmlns:a16="http://schemas.microsoft.com/office/drawing/2014/main" id="{28B2E7BA-981E-408A-8C92-C321112171A7}"/>
+              </a:ext>
+            </a:extLst>
+          </p:cNvPr>
+          <p:cNvSpPr>
+            <a:spLocks noGrp="1"/>
+          </p:cNvSpPr>
+          <p:nvPr>
+            <p:ph type="sldNum" sz="quarter" idx="12"/>
+          </p:nvPr>
+        </p:nvSpPr>
+        <p:spPr/>
+        <p:txBody>
+          <a:bodyPr/>
+          <a:lstStyle/>
+          <a:p>
+            <a:fld id="{25CE93BE-EA2B-4B23-A2D3-372777BB019B}" type="slidenum">
+              <a:rPr lang="de-DE" smtClean="0"/>
+              <a:t>3</a:t>
+            </a:fld>
+            <a:endParaRPr lang="de-DE" dirty="0"/>
+          </a:p>
+        </p:txBody>
+      </p:sp>
+      <p:sp>
+        <p:nvSpPr>
+          <p:cNvPr id="5" name="Fußzeilenplatzhalter 4">
+            <a:extLst>
+              <a:ext uri="{FF2B5EF4-FFF2-40B4-BE49-F238E27FC236}">
+                <a16:creationId xmlns:a16="http://schemas.microsoft.com/office/drawing/2014/main" id="{D57CADA9-34E6-40F4-AB15-75A72BD80DFA}"/>
+              </a:ext>
+            </a:extLst>
+          </p:cNvPr>
+          <p:cNvSpPr>
+            <a:spLocks noGrp="1"/>
+          </p:cNvSpPr>
+          <p:nvPr>
+            <p:ph type="ftr" sz="quarter" idx="11"/>
+          </p:nvPr>
+        </p:nvSpPr>
+        <p:spPr/>
+        <p:txBody>
+          <a:bodyPr/>
+          <a:lstStyle/>
+          <a:p>
+            <a:r>
+              <a:rPr lang="de-DE"/>
+              <a:t>Fynn Klöpper - NodeJS &amp; API-Technologien</a:t>
+            </a:r>
+          </a:p>
+        </p:txBody>
+      </p:sp>
+      <p:pic>
+        <p:nvPicPr>
+          <p:cNvPr id="3076" name="Picture 4" descr="Bildergebnis fÃ¼r node js">
+            <a:extLst>
+              <a:ext uri="{FF2B5EF4-FFF2-40B4-BE49-F238E27FC236}">
+                <a16:creationId xmlns:a16="http://schemas.microsoft.com/office/drawing/2014/main" id="{786E0DFB-FE57-49DB-B4B6-39943C82FBD4}"/>
+              </a:ext>
+            </a:extLst>
+          </p:cNvPr>
+          <p:cNvPicPr>
+            <a:picLocks noChangeAspect="1" noChangeArrowheads="1"/>
+          </p:cNvPicPr>
+          <p:nvPr/>
+        </p:nvPicPr>
+        <p:blipFill>
+          <a:blip r:embed="rId2">
+            <a:extLst>
+              <a:ext uri="{28A0092B-C50C-407E-A947-70E740481C1C}">
+                <a14:useLocalDpi xmlns:a14="http://schemas.microsoft.com/office/drawing/2010/main" val="0"/>
+              </a:ext>
+            </a:extLst>
+          </a:blip>
+          <a:srcRect/>
+          <a:stretch>
+            <a:fillRect/>
+          </a:stretch>
+        </p:blipFill>
+        <p:spPr bwMode="auto">
+          <a:xfrm>
+            <a:off x="8457067" y="585216"/>
+            <a:ext cx="2867100" cy="1755539"/>
+          </a:xfrm>
+          <a:prstGeom prst="rect">
+            <a:avLst/>
+          </a:prstGeom>
+          <a:noFill/>
+          <a:extLst>
+            <a:ext uri="{909E8E84-426E-40DD-AFC4-6F175D3DCCD1}">
+              <a14:hiddenFill xmlns:a14="http://schemas.microsoft.com/office/drawing/2010/main">
+                <a:solidFill>
+                  <a:srgbClr val="FFFFFF"/>
+                </a:solidFill>
+              </a14:hiddenFill>
+            </a:ext>
+          </a:extLst>
+        </p:spPr>
+      </p:pic>
+      <p:sp>
+        <p:nvSpPr>
+          <p:cNvPr id="8" name="Textfeld 7">
+            <a:extLst>
+              <a:ext uri="{FF2B5EF4-FFF2-40B4-BE49-F238E27FC236}">
+                <a16:creationId xmlns:a16="http://schemas.microsoft.com/office/drawing/2014/main" id="{9BDAAC54-E8A2-47E0-B04C-1DFA967CE2EE}"/>
+              </a:ext>
+            </a:extLst>
+          </p:cNvPr>
+          <p:cNvSpPr txBox="1"/>
+          <p:nvPr/>
+        </p:nvSpPr>
+        <p:spPr>
+          <a:xfrm>
+            <a:off x="9027542" y="2340755"/>
+            <a:ext cx="2140330" cy="338554"/>
+          </a:xfrm>
+          <a:prstGeom prst="rect">
+            <a:avLst/>
+          </a:prstGeom>
+          <a:noFill/>
+        </p:spPr>
+        <p:txBody>
+          <a:bodyPr wrap="none" rtlCol="0">
+            <a:spAutoFit/>
+          </a:bodyPr>
+          <a:lstStyle/>
+          <a:p>
+            <a:r>
+              <a:rPr lang="de-DE" sz="800" dirty="0">
+                <a:solidFill>
+                  <a:schemeClr val="bg1">
+                    <a:lumMod val="65000"/>
+                  </a:schemeClr>
+                </a:solidFill>
+              </a:rPr>
+              <a:t>https://tutorials-raspberrypi.de/raspberry</a:t>
+            </a:r>
+          </a:p>
+          <a:p>
+            <a:r>
+              <a:rPr lang="de-DE" sz="800" dirty="0">
+                <a:solidFill>
+                  <a:schemeClr val="bg1">
+                    <a:lumMod val="65000"/>
+                  </a:schemeClr>
+                </a:solidFill>
+              </a:rPr>
+              <a:t>-pi-nodejs-webserver-installieren-gpios-steuern/</a:t>
+            </a:r>
+          </a:p>
+        </p:txBody>
+      </p:sp>
+    </p:spTree>
+    <p:extLst>
+      <p:ext uri="{BB962C8B-B14F-4D97-AF65-F5344CB8AC3E}">
+        <p14:creationId xmlns:p14="http://schemas.microsoft.com/office/powerpoint/2010/main" val="851020721"/>
+      </p:ext>
+    </p:extLst>
+  </p:cSld>
+  <p:clrMapOvr>
+    <a:masterClrMapping/>
+  </p:clrMapOvr>
+</p:sld>
+</file>
+
+<file path=ppt/slides/slide30.xml><?xml version="1.0" encoding="utf-8"?>
 <p:sld xmlns:a="http://schemas.openxmlformats.org/drawingml/2006/main" xmlns:r="http://schemas.openxmlformats.org/officeDocument/2006/relationships" xmlns:p="http://schemas.openxmlformats.org/presentationml/2006/main">
   <p:cSld>
     <p:spTree>
@@ -6783,8 +8641,8 @@
         </p:nvSpPr>
         <p:spPr>
           <a:xfrm>
-            <a:off x="1870143" y="5887519"/>
-            <a:ext cx="1514389" cy="369332"/>
+            <a:off x="1588789" y="5754342"/>
+            <a:ext cx="2454133" cy="646331"/>
           </a:xfrm>
           <a:prstGeom prst="rect">
             <a:avLst/>
@@ -6799,7 +8657,14 @@
           <a:p>
             <a:r>
               <a:rPr lang="de-DE" b="1" dirty="0"/>
-              <a:t>Mikroservices</a:t>
+              <a:t>Services mit</a:t>
+            </a:r>
+            <a:br>
+              <a:rPr lang="de-DE" b="1" dirty="0"/>
+            </a:br>
+            <a:r>
+              <a:rPr lang="de-DE" b="1" dirty="0"/>
+              <a:t>hohem Datendurchsatz</a:t>
             </a:r>
           </a:p>
         </p:txBody>
@@ -6818,8 +8683,8 @@
         </p:nvSpPr>
         <p:spPr>
           <a:xfrm>
-            <a:off x="5004193" y="5892842"/>
-            <a:ext cx="2183611" cy="369332"/>
+            <a:off x="4842932" y="5754342"/>
+            <a:ext cx="2217851" cy="646331"/>
           </a:xfrm>
           <a:prstGeom prst="rect">
             <a:avLst/>
@@ -6834,7 +8699,14 @@
           <a:p>
             <a:r>
               <a:rPr lang="de-DE" b="1" dirty="0"/>
-              <a:t>Komplexe Methoden</a:t>
+              <a:t>Komplexe Methoden </a:t>
+            </a:r>
+            <a:br>
+              <a:rPr lang="de-DE" b="1" dirty="0"/>
+            </a:br>
+            <a:r>
+              <a:rPr lang="de-DE" b="1" dirty="0"/>
+              <a:t>und Abläufe</a:t>
             </a:r>
           </a:p>
         </p:txBody>
@@ -6853,7 +8725,7 @@
         </p:nvSpPr>
         <p:spPr>
           <a:xfrm>
-            <a:off x="8241644" y="5796643"/>
+            <a:off x="8222189" y="5754341"/>
             <a:ext cx="2757486" cy="646331"/>
           </a:xfrm>
           <a:prstGeom prst="rect">
@@ -6904,9 +8776,9 @@
           <a:p>
             <a:fld id="{25CE93BE-EA2B-4B23-A2D3-372777BB019B}" type="slidenum">
               <a:rPr lang="de-DE" smtClean="0"/>
-              <a:t>24</a:t>
+              <a:t>30</a:t>
             </a:fld>
-            <a:endParaRPr lang="de-DE"/>
+            <a:endParaRPr lang="de-DE" dirty="0"/>
           </a:p>
         </p:txBody>
       </p:sp>
@@ -6951,7 +8823,7 @@
 </p:sld>
 </file>
 
-<file path=ppt/slides/slide25.xml><?xml version="1.0" encoding="utf-8"?>
+<file path=ppt/slides/slide31.xml><?xml version="1.0" encoding="utf-8"?>
 <p:sld xmlns:a="http://schemas.openxmlformats.org/drawingml/2006/main" xmlns:r="http://schemas.openxmlformats.org/officeDocument/2006/relationships" xmlns:p="http://schemas.openxmlformats.org/presentationml/2006/main">
   <p:cSld>
     <p:spTree>
@@ -7062,7 +8934,7 @@
           <a:p>
             <a:fld id="{25CE93BE-EA2B-4B23-A2D3-372777BB019B}" type="slidenum">
               <a:rPr lang="de-DE" smtClean="0"/>
-              <a:t>25</a:t>
+              <a:t>31</a:t>
             </a:fld>
             <a:endParaRPr lang="de-DE"/>
           </a:p>
@@ -7100,179 +8972,6 @@
     <p:extLst>
       <p:ext uri="{BB962C8B-B14F-4D97-AF65-F5344CB8AC3E}">
         <p14:creationId xmlns:p14="http://schemas.microsoft.com/office/powerpoint/2010/main" val="3388972713"/>
-      </p:ext>
-    </p:extLst>
-  </p:cSld>
-  <p:clrMapOvr>
-    <a:masterClrMapping/>
-  </p:clrMapOvr>
-</p:sld>
-</file>
-
-<file path=ppt/slides/slide3.xml><?xml version="1.0" encoding="utf-8"?>
-<p:sld xmlns:a="http://schemas.openxmlformats.org/drawingml/2006/main" xmlns:r="http://schemas.openxmlformats.org/officeDocument/2006/relationships" xmlns:p="http://schemas.openxmlformats.org/presentationml/2006/main">
-  <p:cSld>
-    <p:spTree>
-      <p:nvGrpSpPr>
-        <p:cNvPr id="1" name=""/>
-        <p:cNvGrpSpPr/>
-        <p:nvPr/>
-      </p:nvGrpSpPr>
-      <p:grpSpPr>
-        <a:xfrm>
-          <a:off x="0" y="0"/>
-          <a:ext cx="0" cy="0"/>
-          <a:chOff x="0" y="0"/>
-          <a:chExt cx="0" cy="0"/>
-        </a:xfrm>
-      </p:grpSpPr>
-      <p:sp>
-        <p:nvSpPr>
-          <p:cNvPr id="2" name="Titel 1">
-            <a:extLst>
-              <a:ext uri="{FF2B5EF4-FFF2-40B4-BE49-F238E27FC236}">
-                <a16:creationId xmlns:a16="http://schemas.microsoft.com/office/drawing/2014/main" id="{C3C79C69-DBB1-47EC-865B-F8177BCDD62A}"/>
-              </a:ext>
-            </a:extLst>
-          </p:cNvPr>
-          <p:cNvSpPr>
-            <a:spLocks noGrp="1"/>
-          </p:cNvSpPr>
-          <p:nvPr>
-            <p:ph type="title"/>
-          </p:nvPr>
-        </p:nvSpPr>
-        <p:spPr/>
-        <p:txBody>
-          <a:bodyPr/>
-          <a:lstStyle/>
-          <a:p>
-            <a:r>
-              <a:rPr lang="de-DE" dirty="0" err="1"/>
-              <a:t>NodeJS</a:t>
-            </a:r>
-            <a:r>
-              <a:rPr lang="de-DE" dirty="0"/>
-              <a:t> – Allgemein	</a:t>
-            </a:r>
-          </a:p>
-        </p:txBody>
-      </p:sp>
-      <p:sp>
-        <p:nvSpPr>
-          <p:cNvPr id="3" name="Inhaltsplatzhalter 2">
-            <a:extLst>
-              <a:ext uri="{FF2B5EF4-FFF2-40B4-BE49-F238E27FC236}">
-                <a16:creationId xmlns:a16="http://schemas.microsoft.com/office/drawing/2014/main" id="{F04973C5-AEBF-40B6-A649-44B2F3B12A15}"/>
-              </a:ext>
-            </a:extLst>
-          </p:cNvPr>
-          <p:cNvSpPr>
-            <a:spLocks noGrp="1"/>
-          </p:cNvSpPr>
-          <p:nvPr>
-            <p:ph idx="1"/>
-          </p:nvPr>
-        </p:nvSpPr>
-        <p:spPr/>
-        <p:txBody>
-          <a:bodyPr/>
-          <a:lstStyle/>
-          <a:p>
-            <a:r>
-              <a:rPr lang="de-DE" dirty="0"/>
-              <a:t>Serverseitiges Ausführen von JavaScript</a:t>
-            </a:r>
-          </a:p>
-          <a:p>
-            <a:r>
-              <a:rPr lang="de-DE" dirty="0"/>
-              <a:t>Google </a:t>
-            </a:r>
-            <a:r>
-              <a:rPr lang="de-DE" dirty="0" err="1"/>
-              <a:t>Chrome‘s</a:t>
-            </a:r>
-            <a:r>
-              <a:rPr lang="de-DE" dirty="0"/>
-              <a:t> JavaScript-Laufzeitumgebung V8 </a:t>
-            </a:r>
-          </a:p>
-          <a:p>
-            <a:r>
-              <a:rPr lang="de-DE" dirty="0"/>
-              <a:t>Skalierbare Netzwerkanwendungen</a:t>
-            </a:r>
-          </a:p>
-          <a:p>
-            <a:r>
-              <a:rPr lang="de-DE" dirty="0"/>
-              <a:t>NPM</a:t>
-            </a:r>
-          </a:p>
-        </p:txBody>
-      </p:sp>
-      <p:sp>
-        <p:nvSpPr>
-          <p:cNvPr id="4" name="Foliennummernplatzhalter 3">
-            <a:extLst>
-              <a:ext uri="{FF2B5EF4-FFF2-40B4-BE49-F238E27FC236}">
-                <a16:creationId xmlns:a16="http://schemas.microsoft.com/office/drawing/2014/main" id="{28B2E7BA-981E-408A-8C92-C321112171A7}"/>
-              </a:ext>
-            </a:extLst>
-          </p:cNvPr>
-          <p:cNvSpPr>
-            <a:spLocks noGrp="1"/>
-          </p:cNvSpPr>
-          <p:nvPr>
-            <p:ph type="sldNum" sz="quarter" idx="12"/>
-          </p:nvPr>
-        </p:nvSpPr>
-        <p:spPr/>
-        <p:txBody>
-          <a:bodyPr/>
-          <a:lstStyle/>
-          <a:p>
-            <a:fld id="{25CE93BE-EA2B-4B23-A2D3-372777BB019B}" type="slidenum">
-              <a:rPr lang="de-DE" smtClean="0"/>
-              <a:t>3</a:t>
-            </a:fld>
-            <a:endParaRPr lang="de-DE" dirty="0"/>
-          </a:p>
-        </p:txBody>
-      </p:sp>
-      <p:sp>
-        <p:nvSpPr>
-          <p:cNvPr id="5" name="Fußzeilenplatzhalter 4">
-            <a:extLst>
-              <a:ext uri="{FF2B5EF4-FFF2-40B4-BE49-F238E27FC236}">
-                <a16:creationId xmlns:a16="http://schemas.microsoft.com/office/drawing/2014/main" id="{D57CADA9-34E6-40F4-AB15-75A72BD80DFA}"/>
-              </a:ext>
-            </a:extLst>
-          </p:cNvPr>
-          <p:cNvSpPr>
-            <a:spLocks noGrp="1"/>
-          </p:cNvSpPr>
-          <p:nvPr>
-            <p:ph type="ftr" sz="quarter" idx="11"/>
-          </p:nvPr>
-        </p:nvSpPr>
-        <p:spPr/>
-        <p:txBody>
-          <a:bodyPr/>
-          <a:lstStyle/>
-          <a:p>
-            <a:r>
-              <a:rPr lang="de-DE"/>
-              <a:t>Fynn Klöpper - NodeJS &amp; API-Technologien</a:t>
-            </a:r>
-          </a:p>
-        </p:txBody>
-      </p:sp>
-    </p:spTree>
-    <p:extLst>
-      <p:ext uri="{BB962C8B-B14F-4D97-AF65-F5344CB8AC3E}">
-        <p14:creationId xmlns:p14="http://schemas.microsoft.com/office/powerpoint/2010/main" val="851020721"/>
       </p:ext>
     </p:extLst>
   </p:cSld>
@@ -7594,6 +9293,47 @@
           </a:p>
         </p:txBody>
       </p:sp>
+      <p:sp>
+        <p:nvSpPr>
+          <p:cNvPr id="8" name="Textfeld 7">
+            <a:extLst>
+              <a:ext uri="{FF2B5EF4-FFF2-40B4-BE49-F238E27FC236}">
+                <a16:creationId xmlns:a16="http://schemas.microsoft.com/office/drawing/2014/main" id="{8C618D71-FEB6-4E13-BE91-6C570F8AB161}"/>
+              </a:ext>
+            </a:extLst>
+          </p:cNvPr>
+          <p:cNvSpPr txBox="1"/>
+          <p:nvPr/>
+        </p:nvSpPr>
+        <p:spPr>
+          <a:xfrm>
+            <a:off x="4357571" y="6316813"/>
+            <a:ext cx="2674130" cy="215444"/>
+          </a:xfrm>
+          <a:prstGeom prst="rect">
+            <a:avLst/>
+          </a:prstGeom>
+          <a:noFill/>
+        </p:spPr>
+        <p:txBody>
+          <a:bodyPr wrap="none" rtlCol="0">
+            <a:spAutoFit/>
+          </a:bodyPr>
+          <a:lstStyle/>
+          <a:p>
+            <a:r>
+              <a:rPr lang="de-DE" sz="800" dirty="0">
+                <a:solidFill>
+                  <a:schemeClr val="bg1">
+                    <a:lumMod val="65000"/>
+                  </a:schemeClr>
+                </a:solidFill>
+              </a:rPr>
+              <a:t>https://www.slideshare.net/elachechebedis/nodejs-essentials</a:t>
+            </a:r>
+          </a:p>
+        </p:txBody>
+      </p:sp>
     </p:spTree>
     <p:extLst>
       <p:ext uri="{BB962C8B-B14F-4D97-AF65-F5344CB8AC3E}">
@@ -8233,6 +9973,77 @@
             <a:r>
               <a:rPr lang="de-DE"/>
               <a:t>Fynn Klöpper - NodeJS &amp; API-Technologien</a:t>
+            </a:r>
+          </a:p>
+        </p:txBody>
+      </p:sp>
+      <p:pic>
+        <p:nvPicPr>
+          <p:cNvPr id="7" name="Grafik 6">
+            <a:extLst>
+              <a:ext uri="{FF2B5EF4-FFF2-40B4-BE49-F238E27FC236}">
+                <a16:creationId xmlns:a16="http://schemas.microsoft.com/office/drawing/2014/main" id="{1268D5C4-DA39-4316-B1C7-6165C28064CA}"/>
+              </a:ext>
+            </a:extLst>
+          </p:cNvPr>
+          <p:cNvPicPr>
+            <a:picLocks noChangeAspect="1"/>
+          </p:cNvPicPr>
+          <p:nvPr/>
+        </p:nvPicPr>
+        <p:blipFill>
+          <a:blip r:embed="rId2"/>
+          <a:stretch>
+            <a:fillRect/>
+          </a:stretch>
+        </p:blipFill>
+        <p:spPr>
+          <a:xfrm>
+            <a:off x="8952442" y="585216"/>
+            <a:ext cx="2371725" cy="1181100"/>
+          </a:xfrm>
+          <a:prstGeom prst="rect">
+            <a:avLst/>
+          </a:prstGeom>
+        </p:spPr>
+      </p:pic>
+      <p:sp>
+        <p:nvSpPr>
+          <p:cNvPr id="8" name="Textfeld 7">
+            <a:extLst>
+              <a:ext uri="{FF2B5EF4-FFF2-40B4-BE49-F238E27FC236}">
+                <a16:creationId xmlns:a16="http://schemas.microsoft.com/office/drawing/2014/main" id="{5712D2E6-8A55-4E8F-8C8E-E75775736257}"/>
+              </a:ext>
+            </a:extLst>
+          </p:cNvPr>
+          <p:cNvSpPr txBox="1"/>
+          <p:nvPr/>
+        </p:nvSpPr>
+        <p:spPr>
+          <a:xfrm>
+            <a:off x="9759577" y="1812391"/>
+            <a:ext cx="832279" cy="215444"/>
+          </a:xfrm>
+          <a:prstGeom prst="rect">
+            <a:avLst/>
+          </a:prstGeom>
+          <a:noFill/>
+        </p:spPr>
+        <p:txBody>
+          <a:bodyPr wrap="none" rtlCol="0">
+            <a:spAutoFit/>
+          </a:bodyPr>
+          <a:lstStyle/>
+          <a:p>
+            <a:r>
+              <a:rPr lang="de-DE" sz="800" dirty="0">
+                <a:solidFill>
+                  <a:schemeClr val="bg1">
+                    <a:lumMod val="65000"/>
+                  </a:schemeClr>
+                </a:solidFill>
+              </a:rPr>
+              <a:t>https://grpc.io/</a:t>
             </a:r>
           </a:p>
         </p:txBody>

</xml_diff>